<commit_message>
Esercizi Annalisa e Tutorato completo
</commit_message>
<xml_diff>
--- a/UniPD/Tutor Didattico/P2 - Semestre 1/08-11/Tutorato 2.pptx
+++ b/UniPD/Tutor Didattico/P2 - Semestre 1/08-11/Tutorato 2.pptx
@@ -23,24 +23,24 @@
     <p:sldId id="309" r:id="rId14"/>
     <p:sldId id="310" r:id="rId15"/>
     <p:sldId id="311" r:id="rId16"/>
-    <p:sldId id="312" r:id="rId17"/>
-    <p:sldId id="313" r:id="rId18"/>
-    <p:sldId id="283" r:id="rId19"/>
-    <p:sldId id="297" r:id="rId20"/>
-    <p:sldId id="314" r:id="rId21"/>
-    <p:sldId id="315" r:id="rId22"/>
-    <p:sldId id="316" r:id="rId23"/>
-    <p:sldId id="320" r:id="rId24"/>
-    <p:sldId id="318" r:id="rId25"/>
-    <p:sldId id="317" r:id="rId26"/>
-    <p:sldId id="321" r:id="rId27"/>
-    <p:sldId id="323" r:id="rId28"/>
-    <p:sldId id="322" r:id="rId29"/>
-    <p:sldId id="324" r:id="rId30"/>
-    <p:sldId id="325" r:id="rId31"/>
-    <p:sldId id="326" r:id="rId32"/>
-    <p:sldId id="327" r:id="rId33"/>
-    <p:sldId id="328" r:id="rId34"/>
+    <p:sldId id="329" r:id="rId17"/>
+    <p:sldId id="330" r:id="rId18"/>
+    <p:sldId id="331" r:id="rId19"/>
+    <p:sldId id="312" r:id="rId20"/>
+    <p:sldId id="313" r:id="rId21"/>
+    <p:sldId id="283" r:id="rId22"/>
+    <p:sldId id="297" r:id="rId23"/>
+    <p:sldId id="314" r:id="rId24"/>
+    <p:sldId id="315" r:id="rId25"/>
+    <p:sldId id="316" r:id="rId26"/>
+    <p:sldId id="332" r:id="rId27"/>
+    <p:sldId id="322" r:id="rId28"/>
+    <p:sldId id="324" r:id="rId29"/>
+    <p:sldId id="325" r:id="rId30"/>
+    <p:sldId id="327" r:id="rId31"/>
+    <p:sldId id="328" r:id="rId32"/>
+    <p:sldId id="333" r:id="rId33"/>
+    <p:sldId id="334" r:id="rId34"/>
   </p:sldIdLst>
   <p:sldSz cx="9144000" cy="6858000" type="screen4x3"/>
   <p:notesSz cx="6858000" cy="9144000"/>
@@ -229,7 +229,7 @@
           <a:p>
             <a:fld id="{0E4AAC6D-2322-45B9-8ECA-34DF280B0776}" type="datetimeFigureOut">
               <a:rPr lang="en-US" smtClean="0"/>
-              <a:t>11/1/2023</a:t>
+              <a:t>11/5/2023</a:t>
             </a:fld>
             <a:endParaRPr lang="en-US"/>
           </a:p>
@@ -2242,7 +2242,7 @@
         <p:spPr>
           <a:xfrm>
             <a:off x="554255" y="1785889"/>
-            <a:ext cx="8173512" cy="3139321"/>
+            <a:ext cx="8173512" cy="4247317"/>
           </a:xfrm>
           <a:prstGeom prst="rect">
             <a:avLst/>
@@ -2265,6 +2265,9 @@
             </a:r>
           </a:p>
           <a:p>
+            <a:endParaRPr lang="it-IT" b="1" dirty="0"/>
+          </a:p>
+          <a:p>
             <a:pPr marL="742950" lvl="1" indent="-285750">
               <a:buFont typeface="Arial" panose="020B0604020202020204" pitchFamily="34" charset="0"/>
               <a:buChar char="•"/>
@@ -2292,6 +2295,9 @@
             </a:r>
           </a:p>
           <a:p>
+            <a:endParaRPr lang="it-IT" b="1" dirty="0"/>
+          </a:p>
+          <a:p>
             <a:pPr marL="742950" lvl="1" indent="-285750">
               <a:buFont typeface="Arial" panose="020B0604020202020204" pitchFamily="34" charset="0"/>
               <a:buChar char="•"/>
@@ -2302,6 +2308,10 @@
             </a:r>
           </a:p>
           <a:p>
+            <a:pPr lvl="1"/>
+            <a:endParaRPr lang="it-IT" dirty="0"/>
+          </a:p>
+          <a:p>
             <a:pPr marL="742950" lvl="1" indent="-285750">
               <a:buFont typeface="Arial" panose="020B0604020202020204" pitchFamily="34" charset="0"/>
               <a:buChar char="•"/>
@@ -2310,6 +2320,10 @@
               <a:rPr lang="it-IT" dirty="0"/>
               <a:t>Questo include la copia non solo della struttura di primo livello, ma anche di tutti gli oggetti annidati.</a:t>
             </a:r>
+          </a:p>
+          <a:p>
+            <a:pPr lvl="1"/>
+            <a:endParaRPr lang="it-IT" dirty="0"/>
           </a:p>
           <a:p>
             <a:pPr marL="742950" lvl="1" indent="-285750">
@@ -2649,8 +2663,8 @@
         </p:blipFill>
         <p:spPr>
           <a:xfrm>
-            <a:off x="414742" y="3285358"/>
-            <a:ext cx="2792327" cy="1700709"/>
+            <a:off x="349385" y="3295506"/>
+            <a:ext cx="3045638" cy="1854992"/>
           </a:xfrm>
           <a:prstGeom prst="rect">
             <a:avLst/>
@@ -2679,8 +2693,8 @@
         </p:blipFill>
         <p:spPr>
           <a:xfrm>
-            <a:off x="4160214" y="2915089"/>
-            <a:ext cx="4325448" cy="2666818"/>
+            <a:off x="3918857" y="2972873"/>
+            <a:ext cx="5065569" cy="3123133"/>
           </a:xfrm>
           <a:prstGeom prst="rect">
             <a:avLst/>
@@ -3202,7 +3216,7 @@
           <a:p>
             <a:r>
               <a:rPr lang="it-IT" dirty="0"/>
-              <a:t>Valore vs riferimento</a:t>
+              <a:t>Copia profonda: conseguenze</a:t>
             </a:r>
           </a:p>
         </p:txBody>
@@ -3255,7 +3269,7 @@
         <p:spPr>
           <a:xfrm>
             <a:off x="349385" y="1474501"/>
-            <a:ext cx="8635041" cy="4247317"/>
+            <a:ext cx="8635041" cy="3693319"/>
           </a:xfrm>
           <a:prstGeom prst="rect">
             <a:avLst/>
@@ -3269,12 +3283,61 @@
           <a:lstStyle/>
           <a:p>
             <a:r>
-              <a:rPr lang="it-IT" b="1" dirty="0"/>
-              <a:t>Valore:</a:t>
+              <a:rPr lang="it-IT" dirty="0"/>
+              <a:t>Per mantenere uno stato consistente dopo </a:t>
+            </a:r>
+            <a:r>
+              <a:rPr lang="it-IT" dirty="0">
+                <a:latin typeface="Courier New" panose="02070309020205020404" pitchFamily="49" charset="0"/>
+                <a:cs typeface="Courier New" panose="02070309020205020404" pitchFamily="49" charset="0"/>
+              </a:rPr>
+              <a:t>b2.Togli_Telefonata(t1)</a:t>
+            </a:r>
+          </a:p>
+          <a:p>
+            <a:endParaRPr lang="it-IT" dirty="0">
+              <a:latin typeface="Courier New" panose="02070309020205020404" pitchFamily="49" charset="0"/>
+              <a:cs typeface="Courier New" panose="02070309020205020404" pitchFamily="49" charset="0"/>
+            </a:endParaRPr>
+          </a:p>
+          <a:p>
+            <a:r>
+              <a:rPr lang="it-IT" dirty="0"/>
+              <a:t>Possiamo incapsulare in una classe il puntatore nodo, costruttore di copia e distruttore in una classe che «conta quanti riferimenti facciamo ad un dato».</a:t>
             </a:r>
           </a:p>
           <a:p>
             <a:endParaRPr lang="it-IT" dirty="0"/>
+          </a:p>
+          <a:p>
+            <a:r>
+              <a:rPr lang="it-IT" dirty="0"/>
+              <a:t>Questo dà luogo ai cosiddetti </a:t>
+            </a:r>
+            <a:r>
+              <a:rPr lang="it-IT" i="1" dirty="0"/>
+              <a:t>smart pointer</a:t>
+            </a:r>
+            <a:r>
+              <a:rPr lang="it-IT" dirty="0"/>
+              <a:t>.</a:t>
+            </a:r>
+          </a:p>
+          <a:p>
+            <a:endParaRPr lang="it-IT" dirty="0"/>
+          </a:p>
+          <a:p>
+            <a:r>
+              <a:rPr lang="it-IT" dirty="0"/>
+              <a:t>Esempio utilizzo: </a:t>
+            </a:r>
+            <a:r>
+              <a:rPr lang="it-IT" dirty="0">
+                <a:latin typeface="Courier New" panose="02070309020205020404" pitchFamily="49" charset="0"/>
+                <a:cs typeface="Courier New" panose="02070309020205020404" pitchFamily="49" charset="0"/>
+              </a:rPr>
+              <a:t>std::shared_ptr</a:t>
+            </a:r>
           </a:p>
           <a:p>
             <a:pPr marL="285750" indent="-285750">
@@ -3283,7 +3346,7 @@
             </a:pPr>
             <a:r>
               <a:rPr lang="it-IT" dirty="0"/>
-              <a:t>Viene creato un duplicato (copia) del valore originale (uso memoria) </a:t>
+              <a:t>Conteggio dei riferimenti al dato a cui punta. </a:t>
             </a:r>
           </a:p>
           <a:p>
@@ -3293,25 +3356,7 @@
             </a:pPr>
             <a:r>
               <a:rPr lang="it-IT" dirty="0"/>
-              <a:t>La funzione lavora con una copia dei dati, e qualsiasi modifica effettuata all'interno della funzione non influisce sulla variabile o sull'oggetto originale.</a:t>
-            </a:r>
-          </a:p>
-          <a:p>
-            <a:pPr marL="285750" indent="-285750">
-              <a:buFont typeface="Arial" panose="020B0604020202020204" pitchFamily="34" charset="0"/>
-              <a:buChar char="•"/>
-            </a:pPr>
-            <a:r>
-              <a:rPr lang="it-IT" dirty="0"/>
-              <a:t>Aka = </a:t>
-            </a:r>
-            <a:r>
-              <a:rPr lang="it-IT" u="sng" dirty="0"/>
-              <a:t>Si condivisione </a:t>
-            </a:r>
-            <a:r>
-              <a:rPr lang="it-IT" dirty="0"/>
-              <a:t>di memoria, modifiche solo alla variabile nella funzione, memoria non deallocata</a:t>
+              <a:t>Quando il conteggio dei riferimenti raggiunge zero (cioè nessun oggetto sta più puntando al dato), la memoria associata viene automaticamente liberata. </a:t>
             </a:r>
           </a:p>
           <a:p>
@@ -3319,49 +3364,8 @@
           </a:p>
           <a:p>
             <a:r>
-              <a:rPr lang="it-IT" b="1" dirty="0"/>
-              <a:t>Riferimento:</a:t>
-            </a:r>
-          </a:p>
-          <a:p>
-            <a:endParaRPr lang="it-IT" dirty="0"/>
-          </a:p>
-          <a:p>
-            <a:pPr marL="285750" indent="-285750">
-              <a:buFont typeface="Arial" panose="020B0604020202020204" pitchFamily="34" charset="0"/>
-              <a:buChar char="•"/>
-            </a:pPr>
-            <a:r>
-              <a:rPr lang="it-IT" dirty="0"/>
-              <a:t>Viene passato un riferimento o un puntatore all'oggetto originale (non uso memoria). </a:t>
-            </a:r>
-          </a:p>
-          <a:p>
-            <a:pPr marL="285750" indent="-285750">
-              <a:buFont typeface="Arial" panose="020B0604020202020204" pitchFamily="34" charset="0"/>
-              <a:buChar char="•"/>
-            </a:pPr>
-            <a:r>
-              <a:rPr lang="it-IT" dirty="0"/>
-              <a:t>Questo significa che la funzione lavora direttamente con l'oggetto originale, e le modifiche all'interno della funzione si riflettono nell'oggetto originale.</a:t>
-            </a:r>
-          </a:p>
-          <a:p>
-            <a:pPr marL="285750" indent="-285750">
-              <a:buFont typeface="Arial" panose="020B0604020202020204" pitchFamily="34" charset="0"/>
-              <a:buChar char="•"/>
-            </a:pPr>
-            <a:r>
-              <a:rPr lang="it-IT" dirty="0"/>
-              <a:t>Aka = </a:t>
-            </a:r>
-            <a:r>
-              <a:rPr lang="it-IT" u="sng" dirty="0"/>
-              <a:t>No condivisione </a:t>
-            </a:r>
-            <a:r>
-              <a:rPr lang="it-IT" dirty="0"/>
-              <a:t>di memoria, modifiche a tutti gli oggetti puntati, memoria non condivisa (meno dispendioso)</a:t>
+              <a:rPr lang="it-IT" dirty="0"/>
+              <a:t>(Lo accenniamo e basta per far vedere «come fare le cose meglio»</a:t>
             </a:r>
           </a:p>
         </p:txBody>
@@ -3369,7 +3373,7 @@
     </p:spTree>
     <p:extLst>
       <p:ext uri="{BB962C8B-B14F-4D97-AF65-F5344CB8AC3E}">
-        <p14:creationId xmlns:p14="http://schemas.microsoft.com/office/powerpoint/2010/main" val="166357682"/>
+        <p14:creationId xmlns:p14="http://schemas.microsoft.com/office/powerpoint/2010/main" val="129307436"/>
       </p:ext>
     </p:extLst>
   </p:cSld>
@@ -3421,7 +3425,7 @@
           <a:p>
             <a:r>
               <a:rPr lang="it-IT" dirty="0"/>
-              <a:t>Durata delle variabili - lifetime</a:t>
+              <a:t>Esercizio 1: Cosa Stampa</a:t>
             </a:r>
           </a:p>
         </p:txBody>
@@ -3459,94 +3463,70 @@
           </a:p>
         </p:txBody>
       </p:sp>
-      <p:sp>
-        <p:nvSpPr>
-          <p:cNvPr id="3" name="CasellaDiTesto 2">
-            <a:extLst>
-              <a:ext uri="{FF2B5EF4-FFF2-40B4-BE49-F238E27FC236}">
-                <a16:creationId xmlns:a16="http://schemas.microsoft.com/office/drawing/2014/main" id="{62AB47FC-463E-8AD5-F618-A123DA567765}"/>
-              </a:ext>
-            </a:extLst>
-          </p:cNvPr>
-          <p:cNvSpPr txBox="1"/>
+      <p:pic>
+        <p:nvPicPr>
+          <p:cNvPr id="10" name="Immagine 9">
+            <a:extLst>
+              <a:ext uri="{FF2B5EF4-FFF2-40B4-BE49-F238E27FC236}">
+                <a16:creationId xmlns:a16="http://schemas.microsoft.com/office/drawing/2014/main" id="{67D0C9E8-AD06-0552-3336-43AF753C3C3E}"/>
+              </a:ext>
+            </a:extLst>
+          </p:cNvPr>
+          <p:cNvPicPr>
+            <a:picLocks noChangeAspect="1"/>
+          </p:cNvPicPr>
           <p:nvPr/>
-        </p:nvSpPr>
+        </p:nvPicPr>
+        <p:blipFill>
+          <a:blip r:embed="rId2"/>
+          <a:stretch>
+            <a:fillRect/>
+          </a:stretch>
+        </p:blipFill>
         <p:spPr>
           <a:xfrm>
-            <a:off x="254479" y="2164614"/>
-            <a:ext cx="8635041" cy="2308324"/>
+            <a:off x="278341" y="1392479"/>
+            <a:ext cx="3619814" cy="4427604"/>
           </a:xfrm>
           <a:prstGeom prst="rect">
             <a:avLst/>
           </a:prstGeom>
-          <a:noFill/>
         </p:spPr>
-        <p:txBody>
-          <a:bodyPr wrap="square" rtlCol="0">
-            <a:spAutoFit/>
-          </a:bodyPr>
-          <a:lstStyle/>
-          <a:p>
-            <a:r>
-              <a:rPr lang="it-IT" b="1" dirty="0"/>
-              <a:t>Variabili di classe automatica: </a:t>
-            </a:r>
-            <a:r>
-              <a:rPr lang="it-IT" dirty="0"/>
-              <a:t>definite dentro una funzione, deallocate al termine del blocco del programma </a:t>
-            </a:r>
-          </a:p>
-          <a:p>
-            <a:endParaRPr lang="it-IT" b="1" dirty="0"/>
-          </a:p>
-          <a:p>
-            <a:r>
-              <a:rPr lang="it-IT" b="1" dirty="0"/>
-              <a:t>Variabili di classe statica: </a:t>
-            </a:r>
-            <a:r>
-              <a:rPr lang="it-IT" dirty="0"/>
-              <a:t>allocate all’inizio dell’esecuzione del programma, deallocate al termine</a:t>
-            </a:r>
-          </a:p>
-          <a:p>
-            <a:endParaRPr lang="it-IT" b="1" dirty="0"/>
-          </a:p>
-          <a:p>
-            <a:r>
-              <a:rPr lang="it-IT" b="1" dirty="0"/>
-              <a:t>Variabili dinamiche: </a:t>
-            </a:r>
-            <a:r>
-              <a:rPr lang="it-IT" dirty="0"/>
-              <a:t>sempre allocate nello heap, deallocata esplicitamente con l’operatore </a:t>
-            </a:r>
-            <a:r>
-              <a:rPr lang="it-IT" dirty="0">
-                <a:latin typeface="Courier New" panose="02070309020205020404" pitchFamily="49" charset="0"/>
-                <a:cs typeface="Courier New" panose="02070309020205020404" pitchFamily="49" charset="0"/>
-              </a:rPr>
-              <a:t>delete</a:t>
-            </a:r>
-            <a:r>
-              <a:rPr lang="it-IT" dirty="0"/>
-              <a:t> (</a:t>
-            </a:r>
-            <a:r>
-              <a:rPr lang="it-IT" u="sng" dirty="0"/>
-              <a:t>garbage collection</a:t>
-            </a:r>
-            <a:r>
-              <a:rPr lang="it-IT" dirty="0"/>
-              <a:t>)</a:t>
-            </a:r>
-          </a:p>
-        </p:txBody>
-      </p:sp>
+      </p:pic>
+      <p:pic>
+        <p:nvPicPr>
+          <p:cNvPr id="12" name="Immagine 11">
+            <a:extLst>
+              <a:ext uri="{FF2B5EF4-FFF2-40B4-BE49-F238E27FC236}">
+                <a16:creationId xmlns:a16="http://schemas.microsoft.com/office/drawing/2014/main" id="{5EF6CEDF-3925-FEFB-B223-DD529BAF83D0}"/>
+              </a:ext>
+            </a:extLst>
+          </p:cNvPr>
+          <p:cNvPicPr>
+            <a:picLocks noChangeAspect="1"/>
+          </p:cNvPicPr>
+          <p:nvPr/>
+        </p:nvPicPr>
+        <p:blipFill>
+          <a:blip r:embed="rId3"/>
+          <a:stretch>
+            <a:fillRect/>
+          </a:stretch>
+        </p:blipFill>
+        <p:spPr>
+          <a:xfrm>
+            <a:off x="4133229" y="1476306"/>
+            <a:ext cx="4732430" cy="4259949"/>
+          </a:xfrm>
+          <a:prstGeom prst="rect">
+            <a:avLst/>
+          </a:prstGeom>
+        </p:spPr>
+      </p:pic>
     </p:spTree>
     <p:extLst>
       <p:ext uri="{BB962C8B-B14F-4D97-AF65-F5344CB8AC3E}">
-        <p14:creationId xmlns:p14="http://schemas.microsoft.com/office/powerpoint/2010/main" val="2847862359"/>
+        <p14:creationId xmlns:p14="http://schemas.microsoft.com/office/powerpoint/2010/main" val="3747721914"/>
       </p:ext>
     </p:extLst>
   </p:cSld>
@@ -3591,12 +3571,14 @@
         </p:nvSpPr>
         <p:spPr/>
         <p:txBody>
-          <a:bodyPr/>
-          <a:lstStyle/>
-          <a:p>
-            <a:r>
-              <a:rPr lang="it-IT" dirty="0"/>
-              <a:t>Costruttori: regole</a:t>
+          <a:bodyPr>
+            <a:normAutofit/>
+          </a:bodyPr>
+          <a:lstStyle/>
+          <a:p>
+            <a:r>
+              <a:rPr lang="it-IT" dirty="0"/>
+              <a:t>Esercizio 1: Cosa Stampa</a:t>
             </a:r>
           </a:p>
         </p:txBody>
@@ -3634,102 +3616,12 @@
           </a:p>
         </p:txBody>
       </p:sp>
-      <p:sp>
-        <p:nvSpPr>
-          <p:cNvPr id="3" name="CasellaDiTesto 2">
-            <a:extLst>
-              <a:ext uri="{FF2B5EF4-FFF2-40B4-BE49-F238E27FC236}">
-                <a16:creationId xmlns:a16="http://schemas.microsoft.com/office/drawing/2014/main" id="{882FCE22-207E-4077-C468-65DB9728DF24}"/>
-              </a:ext>
-            </a:extLst>
-          </p:cNvPr>
-          <p:cNvSpPr txBox="1"/>
-          <p:nvPr/>
-        </p:nvSpPr>
-        <p:spPr>
-          <a:xfrm>
-            <a:off x="993360" y="1534885"/>
-            <a:ext cx="7157279" cy="2308324"/>
-          </a:xfrm>
-          <a:prstGeom prst="rect">
-            <a:avLst/>
-          </a:prstGeom>
-          <a:noFill/>
-        </p:spPr>
-        <p:txBody>
-          <a:bodyPr wrap="square" rtlCol="0">
-            <a:spAutoFit/>
-          </a:bodyPr>
-          <a:lstStyle/>
-          <a:p>
-            <a:pPr marL="342900" indent="-342900">
-              <a:buFont typeface="+mj-lt"/>
-              <a:buAutoNum type="arabicPeriod"/>
-            </a:pPr>
-            <a:r>
-              <a:rPr lang="it-IT" dirty="0"/>
-              <a:t>Usiamo lo stesso ordine di dichiarazione dei campi dati</a:t>
-            </a:r>
-          </a:p>
-          <a:p>
-            <a:pPr marL="342900" indent="-342900">
-              <a:buFont typeface="+mj-lt"/>
-              <a:buAutoNum type="arabicPeriod"/>
-            </a:pPr>
-            <a:endParaRPr lang="it-IT" dirty="0"/>
-          </a:p>
-          <a:p>
-            <a:pPr marL="342900" indent="-342900">
-              <a:buFont typeface="+mj-lt"/>
-              <a:buAutoNum type="arabicPeriod"/>
-            </a:pPr>
-            <a:r>
-              <a:rPr lang="it-IT" dirty="0"/>
-              <a:t>Costruiamo i campi allocando uno spazio in memoria per ogni variabile per i tipi non classe</a:t>
-            </a:r>
-          </a:p>
-          <a:p>
-            <a:pPr marL="342900" indent="-342900">
-              <a:buFont typeface="+mj-lt"/>
-              <a:buAutoNum type="arabicPeriod"/>
-            </a:pPr>
-            <a:endParaRPr lang="it-IT" dirty="0"/>
-          </a:p>
-          <a:p>
-            <a:pPr marL="342900" indent="-342900">
-              <a:buFont typeface="+mj-lt"/>
-              <a:buAutoNum type="arabicPeriod"/>
-            </a:pPr>
-            <a:r>
-              <a:rPr lang="it-IT" dirty="0"/>
-              <a:t>Per ogni campo di tipo classe, chiamiamo costruttore default</a:t>
-            </a:r>
-          </a:p>
-          <a:p>
-            <a:pPr marL="342900" indent="-342900">
-              <a:buFont typeface="+mj-lt"/>
-              <a:buAutoNum type="arabicPeriod"/>
-            </a:pPr>
-            <a:endParaRPr lang="it-IT" dirty="0"/>
-          </a:p>
-          <a:p>
-            <a:pPr marL="342900" indent="-342900">
-              <a:buFont typeface="+mj-lt"/>
-              <a:buAutoNum type="arabicPeriod"/>
-            </a:pPr>
-            <a:r>
-              <a:rPr lang="it-IT" dirty="0"/>
-              <a:t>Eseguiamo il corpo del costruttore</a:t>
-            </a:r>
-          </a:p>
-        </p:txBody>
-      </p:sp>
       <p:pic>
         <p:nvPicPr>
-          <p:cNvPr id="6" name="Immagine 5">
-            <a:extLst>
-              <a:ext uri="{FF2B5EF4-FFF2-40B4-BE49-F238E27FC236}">
-                <a16:creationId xmlns:a16="http://schemas.microsoft.com/office/drawing/2014/main" id="{23A7DF75-AE9D-ACF9-FA18-F2856AD1E584}"/>
+          <p:cNvPr id="5" name="Immagine 4">
+            <a:extLst>
+              <a:ext uri="{FF2B5EF4-FFF2-40B4-BE49-F238E27FC236}">
+                <a16:creationId xmlns:a16="http://schemas.microsoft.com/office/drawing/2014/main" id="{9CF95376-74BB-B61A-7626-0D1724FF3AFC}"/>
               </a:ext>
             </a:extLst>
           </p:cNvPr>
@@ -3746,8 +3638,8 @@
         </p:blipFill>
         <p:spPr>
           <a:xfrm>
-            <a:off x="1666878" y="4263669"/>
-            <a:ext cx="5810244" cy="825719"/>
+            <a:off x="1286012" y="2133675"/>
+            <a:ext cx="6097315" cy="2298365"/>
           </a:xfrm>
           <a:prstGeom prst="rect">
             <a:avLst/>
@@ -3757,7 +3649,7 @@
     </p:spTree>
     <p:extLst>
       <p:ext uri="{BB962C8B-B14F-4D97-AF65-F5344CB8AC3E}">
-        <p14:creationId xmlns:p14="http://schemas.microsoft.com/office/powerpoint/2010/main" val="2865899089"/>
+        <p14:creationId xmlns:p14="http://schemas.microsoft.com/office/powerpoint/2010/main" val="1853938576"/>
       </p:ext>
     </p:extLst>
   </p:cSld>
@@ -3802,12 +3694,14 @@
         </p:nvSpPr>
         <p:spPr/>
         <p:txBody>
-          <a:bodyPr/>
-          <a:lstStyle/>
-          <a:p>
-            <a:r>
-              <a:rPr lang="it-IT" dirty="0"/>
-              <a:t>Distruttori</a:t>
+          <a:bodyPr>
+            <a:normAutofit/>
+          </a:bodyPr>
+          <a:lstStyle/>
+          <a:p>
+            <a:r>
+              <a:rPr lang="it-IT" dirty="0"/>
+              <a:t>Valore vs riferimento</a:t>
             </a:r>
           </a:p>
         </p:txBody>
@@ -3850,7 +3744,7 @@
           <p:cNvPr id="3" name="CasellaDiTesto 2">
             <a:extLst>
               <a:ext uri="{FF2B5EF4-FFF2-40B4-BE49-F238E27FC236}">
-                <a16:creationId xmlns:a16="http://schemas.microsoft.com/office/drawing/2014/main" id="{882FCE22-207E-4077-C468-65DB9728DF24}"/>
+                <a16:creationId xmlns:a16="http://schemas.microsoft.com/office/drawing/2014/main" id="{62AB47FC-463E-8AD5-F618-A123DA567765}"/>
               </a:ext>
             </a:extLst>
           </p:cNvPr>
@@ -3859,8 +3753,8 @@
         </p:nvSpPr>
         <p:spPr>
           <a:xfrm>
-            <a:off x="1020563" y="1440497"/>
-            <a:ext cx="6662374" cy="1477328"/>
+            <a:off x="349385" y="1474501"/>
+            <a:ext cx="8635041" cy="4247317"/>
           </a:xfrm>
           <a:prstGeom prst="rect">
             <a:avLst/>
@@ -3873,13 +3767,22 @@
           </a:bodyPr>
           <a:lstStyle/>
           <a:p>
+            <a:r>
+              <a:rPr lang="it-IT" b="1" dirty="0"/>
+              <a:t>Valore:</a:t>
+            </a:r>
+          </a:p>
+          <a:p>
+            <a:endParaRPr lang="it-IT" dirty="0"/>
+          </a:p>
+          <a:p>
             <a:pPr marL="285750" indent="-285750">
               <a:buFont typeface="Arial" panose="020B0604020202020204" pitchFamily="34" charset="0"/>
               <a:buChar char="•"/>
             </a:pPr>
             <a:r>
               <a:rPr lang="it-IT" dirty="0"/>
-              <a:t>Evitano gli sprechi di memoria e rilasciano la memoria occupata</a:t>
+              <a:t>Viene creato un duplicato (copia) del valore originale (uso memoria) </a:t>
             </a:r>
           </a:p>
           <a:p>
@@ -3887,7 +3790,10 @@
               <a:buFont typeface="Arial" panose="020B0604020202020204" pitchFamily="34" charset="0"/>
               <a:buChar char="•"/>
             </a:pPr>
-            <a:endParaRPr lang="it-IT" dirty="0"/>
+            <a:r>
+              <a:rPr lang="it-IT" dirty="0"/>
+              <a:t>La funzione lavora con una copia dei dati, e qualsiasi modifica effettuata all'interno della funzione non influisce sulla variabile o sull'oggetto originale.</a:t>
+            </a:r>
           </a:p>
           <a:p>
             <a:pPr marL="285750" indent="-285750">
@@ -3896,71 +3802,29 @@
             </a:pPr>
             <a:r>
               <a:rPr lang="it-IT" dirty="0"/>
-              <a:t>Come per i costruttori, di default è disponibile il distruttore standard (esempio qui sotto)</a:t>
+              <a:t>Aka = </a:t>
+            </a:r>
+            <a:r>
+              <a:rPr lang="it-IT" u="sng" dirty="0"/>
+              <a:t>Si condivisione </a:t>
+            </a:r>
+            <a:r>
+              <a:rPr lang="it-IT" dirty="0"/>
+              <a:t>di memoria, modifiche solo alla variabile nella funzione, memoria non deallocata</a:t>
             </a:r>
           </a:p>
           <a:p>
             <a:endParaRPr lang="it-IT" dirty="0"/>
           </a:p>
-        </p:txBody>
-      </p:sp>
-      <p:pic>
-        <p:nvPicPr>
-          <p:cNvPr id="7" name="Immagine 6">
-            <a:extLst>
-              <a:ext uri="{FF2B5EF4-FFF2-40B4-BE49-F238E27FC236}">
-                <a16:creationId xmlns:a16="http://schemas.microsoft.com/office/drawing/2014/main" id="{FF1A6ED0-86E5-DAED-6B91-8D563CB38114}"/>
-              </a:ext>
-            </a:extLst>
-          </p:cNvPr>
-          <p:cNvPicPr>
-            <a:picLocks noChangeAspect="1"/>
-          </p:cNvPicPr>
-          <p:nvPr/>
-        </p:nvPicPr>
-        <p:blipFill>
-          <a:blip r:embed="rId2"/>
-          <a:stretch>
-            <a:fillRect/>
-          </a:stretch>
-        </p:blipFill>
-        <p:spPr>
-          <a:xfrm>
-            <a:off x="3502095" y="2788285"/>
-            <a:ext cx="1749132" cy="911224"/>
-          </a:xfrm>
-          <a:prstGeom prst="rect">
-            <a:avLst/>
-          </a:prstGeom>
-        </p:spPr>
-      </p:pic>
-      <p:sp>
-        <p:nvSpPr>
-          <p:cNvPr id="8" name="CasellaDiTesto 7">
-            <a:extLst>
-              <a:ext uri="{FF2B5EF4-FFF2-40B4-BE49-F238E27FC236}">
-                <a16:creationId xmlns:a16="http://schemas.microsoft.com/office/drawing/2014/main" id="{949235FA-4067-61FC-29AA-97E6509653B2}"/>
-              </a:ext>
-            </a:extLst>
-          </p:cNvPr>
-          <p:cNvSpPr txBox="1"/>
-          <p:nvPr/>
-        </p:nvSpPr>
-        <p:spPr>
-          <a:xfrm>
-            <a:off x="1172963" y="3940176"/>
-            <a:ext cx="6662374" cy="1200329"/>
-          </a:xfrm>
-          <a:prstGeom prst="rect">
-            <a:avLst/>
-          </a:prstGeom>
-          <a:noFill/>
-        </p:spPr>
-        <p:txBody>
-          <a:bodyPr wrap="square" rtlCol="0">
-            <a:spAutoFit/>
-          </a:bodyPr>
-          <a:lstStyle/>
+          <a:p>
+            <a:r>
+              <a:rPr lang="it-IT" b="1" dirty="0"/>
+              <a:t>Riferimento:</a:t>
+            </a:r>
+          </a:p>
+          <a:p>
+            <a:endParaRPr lang="it-IT" dirty="0"/>
+          </a:p>
           <a:p>
             <a:pPr marL="285750" indent="-285750">
               <a:buFont typeface="Arial" panose="020B0604020202020204" pitchFamily="34" charset="0"/>
@@ -3968,18 +3832,43 @@
             </a:pPr>
             <a:r>
               <a:rPr lang="it-IT" dirty="0"/>
-              <a:t>Vogliamo eseguire una distruzione profonda (aka, tutta la memoria allocata dall’oggetto, compresi puntatori e riferimenti, quindi anche tutte le variabili dentro)</a:t>
-            </a:r>
-          </a:p>
-          <a:p>
-            <a:endParaRPr lang="it-IT" dirty="0"/>
+              <a:t>Viene passato un riferimento o un puntatore all'oggetto originale (non uso memoria). </a:t>
+            </a:r>
+          </a:p>
+          <a:p>
+            <a:pPr marL="285750" indent="-285750">
+              <a:buFont typeface="Arial" panose="020B0604020202020204" pitchFamily="34" charset="0"/>
+              <a:buChar char="•"/>
+            </a:pPr>
+            <a:r>
+              <a:rPr lang="it-IT" dirty="0"/>
+              <a:t>Questo significa che la funzione lavora direttamente con l'oggetto originale, e le modifiche all'interno della funzione si riflettono nell'oggetto originale.</a:t>
+            </a:r>
+          </a:p>
+          <a:p>
+            <a:pPr marL="285750" indent="-285750">
+              <a:buFont typeface="Arial" panose="020B0604020202020204" pitchFamily="34" charset="0"/>
+              <a:buChar char="•"/>
+            </a:pPr>
+            <a:r>
+              <a:rPr lang="it-IT" dirty="0"/>
+              <a:t>Aka = </a:t>
+            </a:r>
+            <a:r>
+              <a:rPr lang="it-IT" u="sng" dirty="0"/>
+              <a:t>No condivisione </a:t>
+            </a:r>
+            <a:r>
+              <a:rPr lang="it-IT" dirty="0"/>
+              <a:t>di memoria, modifiche a tutti gli oggetti puntati, memoria non condivisa (meno dispendioso)</a:t>
+            </a:r>
           </a:p>
         </p:txBody>
       </p:sp>
     </p:spTree>
     <p:extLst>
       <p:ext uri="{BB962C8B-B14F-4D97-AF65-F5344CB8AC3E}">
-        <p14:creationId xmlns:p14="http://schemas.microsoft.com/office/powerpoint/2010/main" val="3296739001"/>
+        <p14:creationId xmlns:p14="http://schemas.microsoft.com/office/powerpoint/2010/main" val="166357682"/>
       </p:ext>
     </p:extLst>
   </p:cSld>
@@ -4195,12 +4084,14 @@
         </p:nvSpPr>
         <p:spPr/>
         <p:txBody>
-          <a:bodyPr/>
-          <a:lstStyle/>
-          <a:p>
-            <a:r>
-              <a:rPr lang="it-IT" dirty="0"/>
-              <a:t>Distruttori: regole</a:t>
+          <a:bodyPr>
+            <a:normAutofit/>
+          </a:bodyPr>
+          <a:lstStyle/>
+          <a:p>
+            <a:r>
+              <a:rPr lang="it-IT" dirty="0"/>
+              <a:t>Durata delle variabili - lifetime</a:t>
             </a:r>
           </a:p>
         </p:txBody>
@@ -4243,7 +4134,7 @@
           <p:cNvPr id="3" name="CasellaDiTesto 2">
             <a:extLst>
               <a:ext uri="{FF2B5EF4-FFF2-40B4-BE49-F238E27FC236}">
-                <a16:creationId xmlns:a16="http://schemas.microsoft.com/office/drawing/2014/main" id="{882FCE22-207E-4077-C468-65DB9728DF24}"/>
+                <a16:creationId xmlns:a16="http://schemas.microsoft.com/office/drawing/2014/main" id="{62AB47FC-463E-8AD5-F618-A123DA567765}"/>
               </a:ext>
             </a:extLst>
           </p:cNvPr>
@@ -4252,8 +4143,8 @@
         </p:nvSpPr>
         <p:spPr>
           <a:xfrm>
-            <a:off x="1020563" y="1440497"/>
-            <a:ext cx="6662374" cy="4801314"/>
+            <a:off x="254479" y="2164614"/>
+            <a:ext cx="8635041" cy="2308324"/>
           </a:xfrm>
           <a:prstGeom prst="rect">
             <a:avLst/>
@@ -4266,59 +4157,39 @@
           </a:bodyPr>
           <a:lstStyle/>
           <a:p>
-            <a:pPr marL="285750" indent="-285750">
-              <a:buFont typeface="Arial" panose="020B0604020202020204" pitchFamily="34" charset="0"/>
-              <a:buChar char="•"/>
-            </a:pPr>
             <a:r>
               <a:rPr lang="it-IT" b="1" dirty="0"/>
-              <a:t>Oggetti statici</a:t>
-            </a:r>
-            <a:r>
-              <a:rPr lang="it-IT" dirty="0"/>
-              <a:t>: al termine del main (per ultimi)</a:t>
-            </a:r>
-          </a:p>
-          <a:p>
-            <a:pPr marL="285750" indent="-285750">
-              <a:buFont typeface="Arial" panose="020B0604020202020204" pitchFamily="34" charset="0"/>
-              <a:buChar char="•"/>
-            </a:pPr>
-            <a:endParaRPr lang="it-IT" dirty="0"/>
-          </a:p>
-          <a:p>
-            <a:pPr marL="285750" indent="-285750">
-              <a:buFont typeface="Arial" panose="020B0604020202020204" pitchFamily="34" charset="0"/>
-              <a:buChar char="•"/>
-            </a:pPr>
+              <a:t>Variabili di classe automatica: </a:t>
+            </a:r>
+            <a:r>
+              <a:rPr lang="it-IT" dirty="0"/>
+              <a:t>definite dentro una funzione, deallocate al termine del blocco del programma </a:t>
+            </a:r>
+          </a:p>
+          <a:p>
+            <a:endParaRPr lang="it-IT" b="1" dirty="0"/>
+          </a:p>
+          <a:p>
             <a:r>
               <a:rPr lang="it-IT" b="1" dirty="0"/>
-              <a:t>Oggetti di classe automatica</a:t>
-            </a:r>
-            <a:r>
-              <a:rPr lang="it-IT" dirty="0"/>
-              <a:t>: alla fine del blocco di definizione</a:t>
-            </a:r>
-          </a:p>
-          <a:p>
-            <a:pPr marL="285750" indent="-285750">
-              <a:buFont typeface="Arial" panose="020B0604020202020204" pitchFamily="34" charset="0"/>
-              <a:buChar char="•"/>
-            </a:pPr>
-            <a:endParaRPr lang="it-IT" dirty="0"/>
-          </a:p>
-          <a:p>
-            <a:pPr marL="285750" indent="-285750">
-              <a:buFont typeface="Arial" panose="020B0604020202020204" pitchFamily="34" charset="0"/>
-              <a:buChar char="•"/>
-            </a:pPr>
+              <a:t>Variabili di classe statica: </a:t>
+            </a:r>
+            <a:r>
+              <a:rPr lang="it-IT" dirty="0"/>
+              <a:t>allocate all’inizio dell’esecuzione del programma, deallocate al termine</a:t>
+            </a:r>
+          </a:p>
+          <a:p>
+            <a:endParaRPr lang="it-IT" b="1" dirty="0"/>
+          </a:p>
+          <a:p>
             <a:r>
               <a:rPr lang="it-IT" b="1" dirty="0"/>
-              <a:t>Oggetti dinamici</a:t>
-            </a:r>
-            <a:r>
-              <a:rPr lang="it-IT" dirty="0"/>
-              <a:t>: chiamando </a:t>
+              <a:t>Variabili dinamiche: </a:t>
+            </a:r>
+            <a:r>
+              <a:rPr lang="it-IT" dirty="0"/>
+              <a:t>sempre allocate nello heap, deallocata esplicitamente con l’operatore </a:t>
             </a:r>
             <a:r>
               <a:rPr lang="it-IT" dirty="0">
@@ -4327,100 +4198,25 @@
               </a:rPr>
               <a:t>delete</a:t>
             </a:r>
-          </a:p>
-          <a:p>
-            <a:pPr marL="285750" indent="-285750">
-              <a:buFont typeface="Arial" panose="020B0604020202020204" pitchFamily="34" charset="0"/>
-              <a:buChar char="•"/>
-            </a:pPr>
-            <a:endParaRPr lang="it-IT" dirty="0"/>
-          </a:p>
-          <a:p>
+            <a:r>
+              <a:rPr lang="it-IT" dirty="0"/>
+              <a:t> (</a:t>
+            </a:r>
             <a:r>
               <a:rPr lang="it-IT" u="sng" dirty="0"/>
-              <a:t>Seguono l’ordine inverso rispetto alla costruzione dei dati</a:t>
-            </a:r>
-            <a:r>
-              <a:rPr lang="it-IT" dirty="0"/>
-              <a:t>.</a:t>
-            </a:r>
-          </a:p>
-          <a:p>
-            <a:endParaRPr lang="it-IT" u="sng" dirty="0"/>
-          </a:p>
-          <a:p>
-            <a:r>
-              <a:rPr lang="it-IT" dirty="0"/>
-              <a:t>Ordine:</a:t>
-            </a:r>
-          </a:p>
-          <a:p>
-            <a:endParaRPr lang="it-IT" dirty="0"/>
-          </a:p>
-          <a:p>
-            <a:pPr marL="342900" indent="-342900">
-              <a:buFont typeface="+mj-lt"/>
-              <a:buAutoNum type="arabicPeriod"/>
-            </a:pPr>
-            <a:r>
-              <a:rPr lang="it-IT" dirty="0"/>
-              <a:t>variabili locali all’uscita di una funzione</a:t>
-            </a:r>
-          </a:p>
-          <a:p>
-            <a:pPr marL="342900" indent="-342900">
-              <a:buFont typeface="+mj-lt"/>
-              <a:buAutoNum type="arabicPeriod"/>
-            </a:pPr>
-            <a:endParaRPr lang="it-IT" dirty="0"/>
-          </a:p>
-          <a:p>
-            <a:pPr marL="342900" indent="-342900">
-              <a:buFont typeface="+mj-lt"/>
-              <a:buAutoNum type="arabicPeriod"/>
-            </a:pPr>
-            <a:r>
-              <a:rPr lang="it-IT" dirty="0"/>
-              <a:t>oggetto anonimo ritornato per valore (aka, valore passato a una funzione o </a:t>
-            </a:r>
-            <a:r>
-              <a:rPr lang="it-IT" dirty="0">
-                <a:latin typeface="Courier New" panose="02070309020205020404" pitchFamily="49" charset="0"/>
-                <a:cs typeface="Courier New" panose="02070309020205020404" pitchFamily="49" charset="0"/>
-              </a:rPr>
-              <a:t>return</a:t>
+              <a:t>garbage collection</a:t>
             </a:r>
             <a:r>
               <a:rPr lang="it-IT" dirty="0"/>
               <a:t>)</a:t>
             </a:r>
-          </a:p>
-          <a:p>
-            <a:pPr marL="342900" indent="-342900">
-              <a:buFont typeface="+mj-lt"/>
-              <a:buAutoNum type="arabicPeriod"/>
-            </a:pPr>
-            <a:endParaRPr lang="it-IT" dirty="0"/>
-          </a:p>
-          <a:p>
-            <a:pPr marL="342900" indent="-342900">
-              <a:buFont typeface="+mj-lt"/>
-              <a:buAutoNum type="arabicPeriod"/>
-            </a:pPr>
-            <a:r>
-              <a:rPr lang="it-IT" dirty="0"/>
-              <a:t>parametri passati per valore</a:t>
-            </a:r>
-          </a:p>
-          <a:p>
-            <a:endParaRPr lang="it-IT" dirty="0"/>
           </a:p>
         </p:txBody>
       </p:sp>
     </p:spTree>
     <p:extLst>
       <p:ext uri="{BB962C8B-B14F-4D97-AF65-F5344CB8AC3E}">
-        <p14:creationId xmlns:p14="http://schemas.microsoft.com/office/powerpoint/2010/main" val="2614376314"/>
+        <p14:creationId xmlns:p14="http://schemas.microsoft.com/office/powerpoint/2010/main" val="2847862359"/>
       </p:ext>
     </p:extLst>
   </p:cSld>
@@ -4470,7 +4266,7 @@
           <a:p>
             <a:r>
               <a:rPr lang="it-IT" dirty="0"/>
-              <a:t>Distruttori: regole</a:t>
+              <a:t>Costruttori: regole</a:t>
             </a:r>
           </a:p>
         </p:txBody>
@@ -4500,6 +4296,709 @@
               <a:rPr lang="en-US" smtClean="0"/>
               <a:pPr/>
               <a:t>21</a:t>
+            </a:fld>
+            <a:r>
+              <a:rPr lang="en-US" dirty="0"/>
+              <a:t> di 35</a:t>
+            </a:r>
+          </a:p>
+        </p:txBody>
+      </p:sp>
+      <p:sp>
+        <p:nvSpPr>
+          <p:cNvPr id="3" name="CasellaDiTesto 2">
+            <a:extLst>
+              <a:ext uri="{FF2B5EF4-FFF2-40B4-BE49-F238E27FC236}">
+                <a16:creationId xmlns:a16="http://schemas.microsoft.com/office/drawing/2014/main" id="{882FCE22-207E-4077-C468-65DB9728DF24}"/>
+              </a:ext>
+            </a:extLst>
+          </p:cNvPr>
+          <p:cNvSpPr txBox="1"/>
+          <p:nvPr/>
+        </p:nvSpPr>
+        <p:spPr>
+          <a:xfrm>
+            <a:off x="993360" y="1534885"/>
+            <a:ext cx="7157279" cy="2308324"/>
+          </a:xfrm>
+          <a:prstGeom prst="rect">
+            <a:avLst/>
+          </a:prstGeom>
+          <a:noFill/>
+        </p:spPr>
+        <p:txBody>
+          <a:bodyPr wrap="square" rtlCol="0">
+            <a:spAutoFit/>
+          </a:bodyPr>
+          <a:lstStyle/>
+          <a:p>
+            <a:pPr marL="342900" indent="-342900">
+              <a:buFont typeface="+mj-lt"/>
+              <a:buAutoNum type="arabicPeriod"/>
+            </a:pPr>
+            <a:r>
+              <a:rPr lang="it-IT" dirty="0"/>
+              <a:t>Usiamo lo stesso ordine di dichiarazione dei campi dati</a:t>
+            </a:r>
+          </a:p>
+          <a:p>
+            <a:pPr marL="342900" indent="-342900">
+              <a:buFont typeface="+mj-lt"/>
+              <a:buAutoNum type="arabicPeriod"/>
+            </a:pPr>
+            <a:endParaRPr lang="it-IT" dirty="0"/>
+          </a:p>
+          <a:p>
+            <a:pPr marL="342900" indent="-342900">
+              <a:buFont typeface="+mj-lt"/>
+              <a:buAutoNum type="arabicPeriod"/>
+            </a:pPr>
+            <a:r>
+              <a:rPr lang="it-IT" dirty="0"/>
+              <a:t>Costruiamo i campi allocando uno spazio in memoria per ogni variabile per i tipi non classe</a:t>
+            </a:r>
+          </a:p>
+          <a:p>
+            <a:pPr marL="342900" indent="-342900">
+              <a:buFont typeface="+mj-lt"/>
+              <a:buAutoNum type="arabicPeriod"/>
+            </a:pPr>
+            <a:endParaRPr lang="it-IT" dirty="0"/>
+          </a:p>
+          <a:p>
+            <a:pPr marL="342900" indent="-342900">
+              <a:buFont typeface="+mj-lt"/>
+              <a:buAutoNum type="arabicPeriod"/>
+            </a:pPr>
+            <a:r>
+              <a:rPr lang="it-IT" dirty="0"/>
+              <a:t>Per ogni campo di tipo classe, chiamiamo costruttore default</a:t>
+            </a:r>
+          </a:p>
+          <a:p>
+            <a:pPr marL="342900" indent="-342900">
+              <a:buFont typeface="+mj-lt"/>
+              <a:buAutoNum type="arabicPeriod"/>
+            </a:pPr>
+            <a:endParaRPr lang="it-IT" dirty="0"/>
+          </a:p>
+          <a:p>
+            <a:pPr marL="342900" indent="-342900">
+              <a:buFont typeface="+mj-lt"/>
+              <a:buAutoNum type="arabicPeriod"/>
+            </a:pPr>
+            <a:r>
+              <a:rPr lang="it-IT" dirty="0"/>
+              <a:t>Eseguiamo il corpo del costruttore</a:t>
+            </a:r>
+          </a:p>
+        </p:txBody>
+      </p:sp>
+      <p:pic>
+        <p:nvPicPr>
+          <p:cNvPr id="6" name="Immagine 5">
+            <a:extLst>
+              <a:ext uri="{FF2B5EF4-FFF2-40B4-BE49-F238E27FC236}">
+                <a16:creationId xmlns:a16="http://schemas.microsoft.com/office/drawing/2014/main" id="{23A7DF75-AE9D-ACF9-FA18-F2856AD1E584}"/>
+              </a:ext>
+            </a:extLst>
+          </p:cNvPr>
+          <p:cNvPicPr>
+            <a:picLocks noChangeAspect="1"/>
+          </p:cNvPicPr>
+          <p:nvPr/>
+        </p:nvPicPr>
+        <p:blipFill>
+          <a:blip r:embed="rId2"/>
+          <a:stretch>
+            <a:fillRect/>
+          </a:stretch>
+        </p:blipFill>
+        <p:spPr>
+          <a:xfrm>
+            <a:off x="1666878" y="4263669"/>
+            <a:ext cx="5810244" cy="825719"/>
+          </a:xfrm>
+          <a:prstGeom prst="rect">
+            <a:avLst/>
+          </a:prstGeom>
+        </p:spPr>
+      </p:pic>
+    </p:spTree>
+    <p:extLst>
+      <p:ext uri="{BB962C8B-B14F-4D97-AF65-F5344CB8AC3E}">
+        <p14:creationId xmlns:p14="http://schemas.microsoft.com/office/powerpoint/2010/main" val="2865899089"/>
+      </p:ext>
+    </p:extLst>
+  </p:cSld>
+  <p:clrMapOvr>
+    <a:masterClrMapping/>
+  </p:clrMapOvr>
+</p:sld>
+</file>
+
+<file path=ppt/slides/slide22.xml><?xml version="1.0" encoding="utf-8"?>
+<p:sld xmlns:a="http://schemas.openxmlformats.org/drawingml/2006/main" xmlns:r="http://schemas.openxmlformats.org/officeDocument/2006/relationships" xmlns:p="http://schemas.openxmlformats.org/presentationml/2006/main">
+  <p:cSld>
+    <p:spTree>
+      <p:nvGrpSpPr>
+        <p:cNvPr id="1" name=""/>
+        <p:cNvGrpSpPr/>
+        <p:nvPr/>
+      </p:nvGrpSpPr>
+      <p:grpSpPr>
+        <a:xfrm>
+          <a:off x="0" y="0"/>
+          <a:ext cx="0" cy="0"/>
+          <a:chOff x="0" y="0"/>
+          <a:chExt cx="0" cy="0"/>
+        </a:xfrm>
+      </p:grpSpPr>
+      <p:sp>
+        <p:nvSpPr>
+          <p:cNvPr id="2" name="Titolo 1">
+            <a:extLst>
+              <a:ext uri="{FF2B5EF4-FFF2-40B4-BE49-F238E27FC236}">
+                <a16:creationId xmlns:a16="http://schemas.microsoft.com/office/drawing/2014/main" id="{A1C33B46-A1F8-111B-8108-D696C1BBCC68}"/>
+              </a:ext>
+            </a:extLst>
+          </p:cNvPr>
+          <p:cNvSpPr>
+            <a:spLocks noGrp="1"/>
+          </p:cNvSpPr>
+          <p:nvPr>
+            <p:ph type="title"/>
+          </p:nvPr>
+        </p:nvSpPr>
+        <p:spPr/>
+        <p:txBody>
+          <a:bodyPr/>
+          <a:lstStyle/>
+          <a:p>
+            <a:r>
+              <a:rPr lang="it-IT" dirty="0"/>
+              <a:t>Distruttori</a:t>
+            </a:r>
+          </a:p>
+        </p:txBody>
+      </p:sp>
+      <p:sp>
+        <p:nvSpPr>
+          <p:cNvPr id="4" name="Segnaposto numero diapositiva 3">
+            <a:extLst>
+              <a:ext uri="{FF2B5EF4-FFF2-40B4-BE49-F238E27FC236}">
+                <a16:creationId xmlns:a16="http://schemas.microsoft.com/office/drawing/2014/main" id="{30F37182-85E1-1CBA-A05A-CCEC4E40C29C}"/>
+              </a:ext>
+            </a:extLst>
+          </p:cNvPr>
+          <p:cNvSpPr>
+            <a:spLocks noGrp="1"/>
+          </p:cNvSpPr>
+          <p:nvPr>
+            <p:ph type="sldNum" sz="quarter" idx="4"/>
+          </p:nvPr>
+        </p:nvSpPr>
+        <p:spPr/>
+        <p:txBody>
+          <a:bodyPr/>
+          <a:lstStyle/>
+          <a:p>
+            <a:fld id="{4D021CEB-2F22-4EA1-9BAF-E3833982B82A}" type="slidenum">
+              <a:rPr lang="en-US" smtClean="0"/>
+              <a:pPr/>
+              <a:t>22</a:t>
+            </a:fld>
+            <a:r>
+              <a:rPr lang="en-US" dirty="0"/>
+              <a:t> di 35</a:t>
+            </a:r>
+          </a:p>
+        </p:txBody>
+      </p:sp>
+      <p:sp>
+        <p:nvSpPr>
+          <p:cNvPr id="3" name="CasellaDiTesto 2">
+            <a:extLst>
+              <a:ext uri="{FF2B5EF4-FFF2-40B4-BE49-F238E27FC236}">
+                <a16:creationId xmlns:a16="http://schemas.microsoft.com/office/drawing/2014/main" id="{882FCE22-207E-4077-C468-65DB9728DF24}"/>
+              </a:ext>
+            </a:extLst>
+          </p:cNvPr>
+          <p:cNvSpPr txBox="1"/>
+          <p:nvPr/>
+        </p:nvSpPr>
+        <p:spPr>
+          <a:xfrm>
+            <a:off x="1020563" y="1440497"/>
+            <a:ext cx="6662374" cy="1477328"/>
+          </a:xfrm>
+          <a:prstGeom prst="rect">
+            <a:avLst/>
+          </a:prstGeom>
+          <a:noFill/>
+        </p:spPr>
+        <p:txBody>
+          <a:bodyPr wrap="square" rtlCol="0">
+            <a:spAutoFit/>
+          </a:bodyPr>
+          <a:lstStyle/>
+          <a:p>
+            <a:pPr marL="285750" indent="-285750">
+              <a:buFont typeface="Arial" panose="020B0604020202020204" pitchFamily="34" charset="0"/>
+              <a:buChar char="•"/>
+            </a:pPr>
+            <a:r>
+              <a:rPr lang="it-IT" dirty="0"/>
+              <a:t>Evitano gli sprechi di memoria e rilasciano la memoria occupata</a:t>
+            </a:r>
+          </a:p>
+          <a:p>
+            <a:pPr marL="285750" indent="-285750">
+              <a:buFont typeface="Arial" panose="020B0604020202020204" pitchFamily="34" charset="0"/>
+              <a:buChar char="•"/>
+            </a:pPr>
+            <a:endParaRPr lang="it-IT" dirty="0"/>
+          </a:p>
+          <a:p>
+            <a:pPr marL="285750" indent="-285750">
+              <a:buFont typeface="Arial" panose="020B0604020202020204" pitchFamily="34" charset="0"/>
+              <a:buChar char="•"/>
+            </a:pPr>
+            <a:r>
+              <a:rPr lang="it-IT" dirty="0"/>
+              <a:t>Come per i costruttori, di default è disponibile il distruttore standard (esempio qui sotto)</a:t>
+            </a:r>
+          </a:p>
+          <a:p>
+            <a:endParaRPr lang="it-IT" dirty="0"/>
+          </a:p>
+        </p:txBody>
+      </p:sp>
+      <p:pic>
+        <p:nvPicPr>
+          <p:cNvPr id="7" name="Immagine 6">
+            <a:extLst>
+              <a:ext uri="{FF2B5EF4-FFF2-40B4-BE49-F238E27FC236}">
+                <a16:creationId xmlns:a16="http://schemas.microsoft.com/office/drawing/2014/main" id="{FF1A6ED0-86E5-DAED-6B91-8D563CB38114}"/>
+              </a:ext>
+            </a:extLst>
+          </p:cNvPr>
+          <p:cNvPicPr>
+            <a:picLocks noChangeAspect="1"/>
+          </p:cNvPicPr>
+          <p:nvPr/>
+        </p:nvPicPr>
+        <p:blipFill>
+          <a:blip r:embed="rId2"/>
+          <a:stretch>
+            <a:fillRect/>
+          </a:stretch>
+        </p:blipFill>
+        <p:spPr>
+          <a:xfrm>
+            <a:off x="3502095" y="2788285"/>
+            <a:ext cx="1749132" cy="911224"/>
+          </a:xfrm>
+          <a:prstGeom prst="rect">
+            <a:avLst/>
+          </a:prstGeom>
+        </p:spPr>
+      </p:pic>
+      <p:sp>
+        <p:nvSpPr>
+          <p:cNvPr id="8" name="CasellaDiTesto 7">
+            <a:extLst>
+              <a:ext uri="{FF2B5EF4-FFF2-40B4-BE49-F238E27FC236}">
+                <a16:creationId xmlns:a16="http://schemas.microsoft.com/office/drawing/2014/main" id="{949235FA-4067-61FC-29AA-97E6509653B2}"/>
+              </a:ext>
+            </a:extLst>
+          </p:cNvPr>
+          <p:cNvSpPr txBox="1"/>
+          <p:nvPr/>
+        </p:nvSpPr>
+        <p:spPr>
+          <a:xfrm>
+            <a:off x="1172963" y="3940176"/>
+            <a:ext cx="6662374" cy="1200329"/>
+          </a:xfrm>
+          <a:prstGeom prst="rect">
+            <a:avLst/>
+          </a:prstGeom>
+          <a:noFill/>
+        </p:spPr>
+        <p:txBody>
+          <a:bodyPr wrap="square" rtlCol="0">
+            <a:spAutoFit/>
+          </a:bodyPr>
+          <a:lstStyle/>
+          <a:p>
+            <a:pPr marL="285750" indent="-285750">
+              <a:buFont typeface="Arial" panose="020B0604020202020204" pitchFamily="34" charset="0"/>
+              <a:buChar char="•"/>
+            </a:pPr>
+            <a:r>
+              <a:rPr lang="it-IT" dirty="0"/>
+              <a:t>Vogliamo eseguire una distruzione profonda (aka, tutta la memoria allocata dall’oggetto, compresi puntatori e riferimenti, quindi anche tutte le variabili dentro)</a:t>
+            </a:r>
+          </a:p>
+          <a:p>
+            <a:endParaRPr lang="it-IT" dirty="0"/>
+          </a:p>
+        </p:txBody>
+      </p:sp>
+    </p:spTree>
+    <p:extLst>
+      <p:ext uri="{BB962C8B-B14F-4D97-AF65-F5344CB8AC3E}">
+        <p14:creationId xmlns:p14="http://schemas.microsoft.com/office/powerpoint/2010/main" val="3296739001"/>
+      </p:ext>
+    </p:extLst>
+  </p:cSld>
+  <p:clrMapOvr>
+    <a:masterClrMapping/>
+  </p:clrMapOvr>
+</p:sld>
+</file>
+
+<file path=ppt/slides/slide23.xml><?xml version="1.0" encoding="utf-8"?>
+<p:sld xmlns:a="http://schemas.openxmlformats.org/drawingml/2006/main" xmlns:r="http://schemas.openxmlformats.org/officeDocument/2006/relationships" xmlns:p="http://schemas.openxmlformats.org/presentationml/2006/main">
+  <p:cSld>
+    <p:spTree>
+      <p:nvGrpSpPr>
+        <p:cNvPr id="1" name=""/>
+        <p:cNvGrpSpPr/>
+        <p:nvPr/>
+      </p:nvGrpSpPr>
+      <p:grpSpPr>
+        <a:xfrm>
+          <a:off x="0" y="0"/>
+          <a:ext cx="0" cy="0"/>
+          <a:chOff x="0" y="0"/>
+          <a:chExt cx="0" cy="0"/>
+        </a:xfrm>
+      </p:grpSpPr>
+      <p:sp>
+        <p:nvSpPr>
+          <p:cNvPr id="2" name="Titolo 1">
+            <a:extLst>
+              <a:ext uri="{FF2B5EF4-FFF2-40B4-BE49-F238E27FC236}">
+                <a16:creationId xmlns:a16="http://schemas.microsoft.com/office/drawing/2014/main" id="{A1C33B46-A1F8-111B-8108-D696C1BBCC68}"/>
+              </a:ext>
+            </a:extLst>
+          </p:cNvPr>
+          <p:cNvSpPr>
+            <a:spLocks noGrp="1"/>
+          </p:cNvSpPr>
+          <p:nvPr>
+            <p:ph type="title"/>
+          </p:nvPr>
+        </p:nvSpPr>
+        <p:spPr/>
+        <p:txBody>
+          <a:bodyPr/>
+          <a:lstStyle/>
+          <a:p>
+            <a:r>
+              <a:rPr lang="it-IT" dirty="0"/>
+              <a:t>Distruttori: regole</a:t>
+            </a:r>
+          </a:p>
+        </p:txBody>
+      </p:sp>
+      <p:sp>
+        <p:nvSpPr>
+          <p:cNvPr id="4" name="Segnaposto numero diapositiva 3">
+            <a:extLst>
+              <a:ext uri="{FF2B5EF4-FFF2-40B4-BE49-F238E27FC236}">
+                <a16:creationId xmlns:a16="http://schemas.microsoft.com/office/drawing/2014/main" id="{30F37182-85E1-1CBA-A05A-CCEC4E40C29C}"/>
+              </a:ext>
+            </a:extLst>
+          </p:cNvPr>
+          <p:cNvSpPr>
+            <a:spLocks noGrp="1"/>
+          </p:cNvSpPr>
+          <p:nvPr>
+            <p:ph type="sldNum" sz="quarter" idx="4"/>
+          </p:nvPr>
+        </p:nvSpPr>
+        <p:spPr/>
+        <p:txBody>
+          <a:bodyPr/>
+          <a:lstStyle/>
+          <a:p>
+            <a:fld id="{4D021CEB-2F22-4EA1-9BAF-E3833982B82A}" type="slidenum">
+              <a:rPr lang="en-US" smtClean="0"/>
+              <a:pPr/>
+              <a:t>23</a:t>
+            </a:fld>
+            <a:r>
+              <a:rPr lang="en-US" dirty="0"/>
+              <a:t> di 35</a:t>
+            </a:r>
+          </a:p>
+        </p:txBody>
+      </p:sp>
+      <p:sp>
+        <p:nvSpPr>
+          <p:cNvPr id="3" name="CasellaDiTesto 2">
+            <a:extLst>
+              <a:ext uri="{FF2B5EF4-FFF2-40B4-BE49-F238E27FC236}">
+                <a16:creationId xmlns:a16="http://schemas.microsoft.com/office/drawing/2014/main" id="{882FCE22-207E-4077-C468-65DB9728DF24}"/>
+              </a:ext>
+            </a:extLst>
+          </p:cNvPr>
+          <p:cNvSpPr txBox="1"/>
+          <p:nvPr/>
+        </p:nvSpPr>
+        <p:spPr>
+          <a:xfrm>
+            <a:off x="1020563" y="1440497"/>
+            <a:ext cx="6662374" cy="4801314"/>
+          </a:xfrm>
+          <a:prstGeom prst="rect">
+            <a:avLst/>
+          </a:prstGeom>
+          <a:noFill/>
+        </p:spPr>
+        <p:txBody>
+          <a:bodyPr wrap="square" rtlCol="0">
+            <a:spAutoFit/>
+          </a:bodyPr>
+          <a:lstStyle/>
+          <a:p>
+            <a:pPr marL="285750" indent="-285750">
+              <a:buFont typeface="Arial" panose="020B0604020202020204" pitchFamily="34" charset="0"/>
+              <a:buChar char="•"/>
+            </a:pPr>
+            <a:r>
+              <a:rPr lang="it-IT" b="1" dirty="0"/>
+              <a:t>Oggetti statici</a:t>
+            </a:r>
+            <a:r>
+              <a:rPr lang="it-IT" dirty="0"/>
+              <a:t>: al termine del main (per ultimi)</a:t>
+            </a:r>
+          </a:p>
+          <a:p>
+            <a:pPr marL="285750" indent="-285750">
+              <a:buFont typeface="Arial" panose="020B0604020202020204" pitchFamily="34" charset="0"/>
+              <a:buChar char="•"/>
+            </a:pPr>
+            <a:endParaRPr lang="it-IT" dirty="0"/>
+          </a:p>
+          <a:p>
+            <a:pPr marL="285750" indent="-285750">
+              <a:buFont typeface="Arial" panose="020B0604020202020204" pitchFamily="34" charset="0"/>
+              <a:buChar char="•"/>
+            </a:pPr>
+            <a:r>
+              <a:rPr lang="it-IT" b="1" dirty="0"/>
+              <a:t>Oggetti di classe automatica</a:t>
+            </a:r>
+            <a:r>
+              <a:rPr lang="it-IT" dirty="0"/>
+              <a:t>: alla fine del blocco di definizione</a:t>
+            </a:r>
+          </a:p>
+          <a:p>
+            <a:pPr marL="285750" indent="-285750">
+              <a:buFont typeface="Arial" panose="020B0604020202020204" pitchFamily="34" charset="0"/>
+              <a:buChar char="•"/>
+            </a:pPr>
+            <a:endParaRPr lang="it-IT" dirty="0"/>
+          </a:p>
+          <a:p>
+            <a:pPr marL="285750" indent="-285750">
+              <a:buFont typeface="Arial" panose="020B0604020202020204" pitchFamily="34" charset="0"/>
+              <a:buChar char="•"/>
+            </a:pPr>
+            <a:r>
+              <a:rPr lang="it-IT" b="1" dirty="0"/>
+              <a:t>Oggetti dinamici</a:t>
+            </a:r>
+            <a:r>
+              <a:rPr lang="it-IT" dirty="0"/>
+              <a:t>: chiamando </a:t>
+            </a:r>
+            <a:r>
+              <a:rPr lang="it-IT" dirty="0">
+                <a:latin typeface="Courier New" panose="02070309020205020404" pitchFamily="49" charset="0"/>
+                <a:cs typeface="Courier New" panose="02070309020205020404" pitchFamily="49" charset="0"/>
+              </a:rPr>
+              <a:t>delete</a:t>
+            </a:r>
+          </a:p>
+          <a:p>
+            <a:pPr marL="285750" indent="-285750">
+              <a:buFont typeface="Arial" panose="020B0604020202020204" pitchFamily="34" charset="0"/>
+              <a:buChar char="•"/>
+            </a:pPr>
+            <a:endParaRPr lang="it-IT" dirty="0"/>
+          </a:p>
+          <a:p>
+            <a:r>
+              <a:rPr lang="it-IT" u="sng" dirty="0"/>
+              <a:t>Seguono l’ordine inverso rispetto alla costruzione dei dati</a:t>
+            </a:r>
+            <a:r>
+              <a:rPr lang="it-IT" dirty="0"/>
+              <a:t>.</a:t>
+            </a:r>
+          </a:p>
+          <a:p>
+            <a:endParaRPr lang="it-IT" u="sng" dirty="0"/>
+          </a:p>
+          <a:p>
+            <a:r>
+              <a:rPr lang="it-IT" dirty="0"/>
+              <a:t>Ordine:</a:t>
+            </a:r>
+          </a:p>
+          <a:p>
+            <a:endParaRPr lang="it-IT" dirty="0"/>
+          </a:p>
+          <a:p>
+            <a:pPr marL="342900" indent="-342900">
+              <a:buFont typeface="+mj-lt"/>
+              <a:buAutoNum type="arabicPeriod"/>
+            </a:pPr>
+            <a:r>
+              <a:rPr lang="it-IT" dirty="0"/>
+              <a:t>variabili locali all’uscita di una funzione</a:t>
+            </a:r>
+          </a:p>
+          <a:p>
+            <a:pPr marL="342900" indent="-342900">
+              <a:buFont typeface="+mj-lt"/>
+              <a:buAutoNum type="arabicPeriod"/>
+            </a:pPr>
+            <a:endParaRPr lang="it-IT" dirty="0"/>
+          </a:p>
+          <a:p>
+            <a:pPr marL="342900" indent="-342900">
+              <a:buFont typeface="+mj-lt"/>
+              <a:buAutoNum type="arabicPeriod"/>
+            </a:pPr>
+            <a:r>
+              <a:rPr lang="it-IT" dirty="0"/>
+              <a:t>oggetto anonimo ritornato per valore (aka, valore passato a una funzione o </a:t>
+            </a:r>
+            <a:r>
+              <a:rPr lang="it-IT" dirty="0">
+                <a:latin typeface="Courier New" panose="02070309020205020404" pitchFamily="49" charset="0"/>
+                <a:cs typeface="Courier New" panose="02070309020205020404" pitchFamily="49" charset="0"/>
+              </a:rPr>
+              <a:t>return</a:t>
+            </a:r>
+            <a:r>
+              <a:rPr lang="it-IT" dirty="0"/>
+              <a:t>)</a:t>
+            </a:r>
+          </a:p>
+          <a:p>
+            <a:pPr marL="342900" indent="-342900">
+              <a:buFont typeface="+mj-lt"/>
+              <a:buAutoNum type="arabicPeriod"/>
+            </a:pPr>
+            <a:endParaRPr lang="it-IT" dirty="0"/>
+          </a:p>
+          <a:p>
+            <a:pPr marL="342900" indent="-342900">
+              <a:buFont typeface="+mj-lt"/>
+              <a:buAutoNum type="arabicPeriod"/>
+            </a:pPr>
+            <a:r>
+              <a:rPr lang="it-IT" dirty="0"/>
+              <a:t>parametri passati per valore</a:t>
+            </a:r>
+          </a:p>
+          <a:p>
+            <a:endParaRPr lang="it-IT" dirty="0"/>
+          </a:p>
+        </p:txBody>
+      </p:sp>
+    </p:spTree>
+    <p:extLst>
+      <p:ext uri="{BB962C8B-B14F-4D97-AF65-F5344CB8AC3E}">
+        <p14:creationId xmlns:p14="http://schemas.microsoft.com/office/powerpoint/2010/main" val="2614376314"/>
+      </p:ext>
+    </p:extLst>
+  </p:cSld>
+  <p:clrMapOvr>
+    <a:masterClrMapping/>
+  </p:clrMapOvr>
+</p:sld>
+</file>
+
+<file path=ppt/slides/slide24.xml><?xml version="1.0" encoding="utf-8"?>
+<p:sld xmlns:a="http://schemas.openxmlformats.org/drawingml/2006/main" xmlns:r="http://schemas.openxmlformats.org/officeDocument/2006/relationships" xmlns:p="http://schemas.openxmlformats.org/presentationml/2006/main">
+  <p:cSld>
+    <p:spTree>
+      <p:nvGrpSpPr>
+        <p:cNvPr id="1" name=""/>
+        <p:cNvGrpSpPr/>
+        <p:nvPr/>
+      </p:nvGrpSpPr>
+      <p:grpSpPr>
+        <a:xfrm>
+          <a:off x="0" y="0"/>
+          <a:ext cx="0" cy="0"/>
+          <a:chOff x="0" y="0"/>
+          <a:chExt cx="0" cy="0"/>
+        </a:xfrm>
+      </p:grpSpPr>
+      <p:sp>
+        <p:nvSpPr>
+          <p:cNvPr id="2" name="Titolo 1">
+            <a:extLst>
+              <a:ext uri="{FF2B5EF4-FFF2-40B4-BE49-F238E27FC236}">
+                <a16:creationId xmlns:a16="http://schemas.microsoft.com/office/drawing/2014/main" id="{A1C33B46-A1F8-111B-8108-D696C1BBCC68}"/>
+              </a:ext>
+            </a:extLst>
+          </p:cNvPr>
+          <p:cNvSpPr>
+            <a:spLocks noGrp="1"/>
+          </p:cNvSpPr>
+          <p:nvPr>
+            <p:ph type="title"/>
+          </p:nvPr>
+        </p:nvSpPr>
+        <p:spPr/>
+        <p:txBody>
+          <a:bodyPr/>
+          <a:lstStyle/>
+          <a:p>
+            <a:r>
+              <a:rPr lang="it-IT" dirty="0"/>
+              <a:t>Distruttori: regole</a:t>
+            </a:r>
+          </a:p>
+        </p:txBody>
+      </p:sp>
+      <p:sp>
+        <p:nvSpPr>
+          <p:cNvPr id="4" name="Segnaposto numero diapositiva 3">
+            <a:extLst>
+              <a:ext uri="{FF2B5EF4-FFF2-40B4-BE49-F238E27FC236}">
+                <a16:creationId xmlns:a16="http://schemas.microsoft.com/office/drawing/2014/main" id="{30F37182-85E1-1CBA-A05A-CCEC4E40C29C}"/>
+              </a:ext>
+            </a:extLst>
+          </p:cNvPr>
+          <p:cNvSpPr>
+            <a:spLocks noGrp="1"/>
+          </p:cNvSpPr>
+          <p:nvPr>
+            <p:ph type="sldNum" sz="quarter" idx="4"/>
+          </p:nvPr>
+        </p:nvSpPr>
+        <p:spPr/>
+        <p:txBody>
+          <a:bodyPr/>
+          <a:lstStyle/>
+          <a:p>
+            <a:fld id="{4D021CEB-2F22-4EA1-9BAF-E3833982B82A}" type="slidenum">
+              <a:rPr lang="en-US" smtClean="0"/>
+              <a:pPr/>
+              <a:t>24</a:t>
             </a:fld>
             <a:r>
               <a:rPr lang="en-US" dirty="0"/>
@@ -4700,429 +5199,6 @@
 </p:sld>
 </file>
 
-<file path=ppt/slides/slide22.xml><?xml version="1.0" encoding="utf-8"?>
-<p:sld xmlns:a="http://schemas.openxmlformats.org/drawingml/2006/main" xmlns:r="http://schemas.openxmlformats.org/officeDocument/2006/relationships" xmlns:p="http://schemas.openxmlformats.org/presentationml/2006/main">
-  <p:cSld>
-    <p:spTree>
-      <p:nvGrpSpPr>
-        <p:cNvPr id="1" name=""/>
-        <p:cNvGrpSpPr/>
-        <p:nvPr/>
-      </p:nvGrpSpPr>
-      <p:grpSpPr>
-        <a:xfrm>
-          <a:off x="0" y="0"/>
-          <a:ext cx="0" cy="0"/>
-          <a:chOff x="0" y="0"/>
-          <a:chExt cx="0" cy="0"/>
-        </a:xfrm>
-      </p:grpSpPr>
-      <p:sp>
-        <p:nvSpPr>
-          <p:cNvPr id="2" name="Titolo 1">
-            <a:extLst>
-              <a:ext uri="{FF2B5EF4-FFF2-40B4-BE49-F238E27FC236}">
-                <a16:creationId xmlns:a16="http://schemas.microsoft.com/office/drawing/2014/main" id="{A1C33B46-A1F8-111B-8108-D696C1BBCC68}"/>
-              </a:ext>
-            </a:extLst>
-          </p:cNvPr>
-          <p:cNvSpPr>
-            <a:spLocks noGrp="1"/>
-          </p:cNvSpPr>
-          <p:nvPr>
-            <p:ph type="title"/>
-          </p:nvPr>
-        </p:nvSpPr>
-        <p:spPr/>
-        <p:txBody>
-          <a:bodyPr/>
-          <a:lstStyle/>
-          <a:p>
-            <a:r>
-              <a:rPr lang="it-IT" dirty="0"/>
-              <a:t>Esercizio 1(A): Cosa Stampa </a:t>
-            </a:r>
-          </a:p>
-        </p:txBody>
-      </p:sp>
-      <p:sp>
-        <p:nvSpPr>
-          <p:cNvPr id="4" name="Segnaposto numero diapositiva 3">
-            <a:extLst>
-              <a:ext uri="{FF2B5EF4-FFF2-40B4-BE49-F238E27FC236}">
-                <a16:creationId xmlns:a16="http://schemas.microsoft.com/office/drawing/2014/main" id="{30F37182-85E1-1CBA-A05A-CCEC4E40C29C}"/>
-              </a:ext>
-            </a:extLst>
-          </p:cNvPr>
-          <p:cNvSpPr>
-            <a:spLocks noGrp="1"/>
-          </p:cNvSpPr>
-          <p:nvPr>
-            <p:ph type="sldNum" sz="quarter" idx="4"/>
-          </p:nvPr>
-        </p:nvSpPr>
-        <p:spPr/>
-        <p:txBody>
-          <a:bodyPr/>
-          <a:lstStyle/>
-          <a:p>
-            <a:fld id="{4D021CEB-2F22-4EA1-9BAF-E3833982B82A}" type="slidenum">
-              <a:rPr lang="en-US" smtClean="0"/>
-              <a:pPr/>
-              <a:t>22</a:t>
-            </a:fld>
-            <a:r>
-              <a:rPr lang="en-US" dirty="0"/>
-              <a:t> di 35</a:t>
-            </a:r>
-          </a:p>
-        </p:txBody>
-      </p:sp>
-      <p:pic>
-        <p:nvPicPr>
-          <p:cNvPr id="15" name="Immagine 14">
-            <a:extLst>
-              <a:ext uri="{FF2B5EF4-FFF2-40B4-BE49-F238E27FC236}">
-                <a16:creationId xmlns:a16="http://schemas.microsoft.com/office/drawing/2014/main" id="{C6565B1E-5FF0-1AD3-23BE-5E2759B9F4A6}"/>
-              </a:ext>
-            </a:extLst>
-          </p:cNvPr>
-          <p:cNvPicPr>
-            <a:picLocks noChangeAspect="1"/>
-          </p:cNvPicPr>
-          <p:nvPr/>
-        </p:nvPicPr>
-        <p:blipFill>
-          <a:blip r:embed="rId2"/>
-          <a:stretch>
-            <a:fillRect/>
-          </a:stretch>
-        </p:blipFill>
-        <p:spPr>
-          <a:xfrm>
-            <a:off x="931185" y="1524415"/>
-            <a:ext cx="4176122" cy="3688400"/>
-          </a:xfrm>
-          <a:prstGeom prst="rect">
-            <a:avLst/>
-          </a:prstGeom>
-        </p:spPr>
-      </p:pic>
-      <p:pic>
-        <p:nvPicPr>
-          <p:cNvPr id="17" name="Immagine 16">
-            <a:extLst>
-              <a:ext uri="{FF2B5EF4-FFF2-40B4-BE49-F238E27FC236}">
-                <a16:creationId xmlns:a16="http://schemas.microsoft.com/office/drawing/2014/main" id="{CEA26F51-548C-F2E4-CBBC-C484532575C9}"/>
-              </a:ext>
-            </a:extLst>
-          </p:cNvPr>
-          <p:cNvPicPr>
-            <a:picLocks noChangeAspect="1"/>
-          </p:cNvPicPr>
-          <p:nvPr/>
-        </p:nvPicPr>
-        <p:blipFill>
-          <a:blip r:embed="rId3"/>
-          <a:stretch>
-            <a:fillRect/>
-          </a:stretch>
-        </p:blipFill>
-        <p:spPr>
-          <a:xfrm>
-            <a:off x="5735512" y="2005677"/>
-            <a:ext cx="2651990" cy="2484335"/>
-          </a:xfrm>
-          <a:prstGeom prst="rect">
-            <a:avLst/>
-          </a:prstGeom>
-        </p:spPr>
-      </p:pic>
-    </p:spTree>
-    <p:extLst>
-      <p:ext uri="{BB962C8B-B14F-4D97-AF65-F5344CB8AC3E}">
-        <p14:creationId xmlns:p14="http://schemas.microsoft.com/office/powerpoint/2010/main" val="756874062"/>
-      </p:ext>
-    </p:extLst>
-  </p:cSld>
-  <p:clrMapOvr>
-    <a:masterClrMapping/>
-  </p:clrMapOvr>
-</p:sld>
-</file>
-
-<file path=ppt/slides/slide23.xml><?xml version="1.0" encoding="utf-8"?>
-<p:sld xmlns:a="http://schemas.openxmlformats.org/drawingml/2006/main" xmlns:r="http://schemas.openxmlformats.org/officeDocument/2006/relationships" xmlns:p="http://schemas.openxmlformats.org/presentationml/2006/main">
-  <p:cSld>
-    <p:spTree>
-      <p:nvGrpSpPr>
-        <p:cNvPr id="1" name=""/>
-        <p:cNvGrpSpPr/>
-        <p:nvPr/>
-      </p:nvGrpSpPr>
-      <p:grpSpPr>
-        <a:xfrm>
-          <a:off x="0" y="0"/>
-          <a:ext cx="0" cy="0"/>
-          <a:chOff x="0" y="0"/>
-          <a:chExt cx="0" cy="0"/>
-        </a:xfrm>
-      </p:grpSpPr>
-      <p:sp>
-        <p:nvSpPr>
-          <p:cNvPr id="2" name="Titolo 1">
-            <a:extLst>
-              <a:ext uri="{FF2B5EF4-FFF2-40B4-BE49-F238E27FC236}">
-                <a16:creationId xmlns:a16="http://schemas.microsoft.com/office/drawing/2014/main" id="{A1C33B46-A1F8-111B-8108-D696C1BBCC68}"/>
-              </a:ext>
-            </a:extLst>
-          </p:cNvPr>
-          <p:cNvSpPr>
-            <a:spLocks noGrp="1"/>
-          </p:cNvSpPr>
-          <p:nvPr>
-            <p:ph type="title"/>
-          </p:nvPr>
-        </p:nvSpPr>
-        <p:spPr/>
-        <p:txBody>
-          <a:bodyPr/>
-          <a:lstStyle/>
-          <a:p>
-            <a:r>
-              <a:rPr lang="it-IT" dirty="0"/>
-              <a:t>Esercizio 1(A): Soluzione</a:t>
-            </a:r>
-          </a:p>
-        </p:txBody>
-      </p:sp>
-      <p:sp>
-        <p:nvSpPr>
-          <p:cNvPr id="4" name="Segnaposto numero diapositiva 3">
-            <a:extLst>
-              <a:ext uri="{FF2B5EF4-FFF2-40B4-BE49-F238E27FC236}">
-                <a16:creationId xmlns:a16="http://schemas.microsoft.com/office/drawing/2014/main" id="{30F37182-85E1-1CBA-A05A-CCEC4E40C29C}"/>
-              </a:ext>
-            </a:extLst>
-          </p:cNvPr>
-          <p:cNvSpPr>
-            <a:spLocks noGrp="1"/>
-          </p:cNvSpPr>
-          <p:nvPr>
-            <p:ph type="sldNum" sz="quarter" idx="4"/>
-          </p:nvPr>
-        </p:nvSpPr>
-        <p:spPr/>
-        <p:txBody>
-          <a:bodyPr/>
-          <a:lstStyle/>
-          <a:p>
-            <a:fld id="{4D021CEB-2F22-4EA1-9BAF-E3833982B82A}" type="slidenum">
-              <a:rPr lang="en-US" smtClean="0"/>
-              <a:pPr/>
-              <a:t>23</a:t>
-            </a:fld>
-            <a:r>
-              <a:rPr lang="en-US" dirty="0"/>
-              <a:t> di 35</a:t>
-            </a:r>
-          </a:p>
-        </p:txBody>
-      </p:sp>
-      <p:pic>
-        <p:nvPicPr>
-          <p:cNvPr id="5" name="Immagine 4">
-            <a:extLst>
-              <a:ext uri="{FF2B5EF4-FFF2-40B4-BE49-F238E27FC236}">
-                <a16:creationId xmlns:a16="http://schemas.microsoft.com/office/drawing/2014/main" id="{3EF3A74E-A1BF-E370-BE07-60F7CFE5CC6C}"/>
-              </a:ext>
-            </a:extLst>
-          </p:cNvPr>
-          <p:cNvPicPr>
-            <a:picLocks noChangeAspect="1"/>
-          </p:cNvPicPr>
-          <p:nvPr/>
-        </p:nvPicPr>
-        <p:blipFill>
-          <a:blip r:embed="rId2"/>
-          <a:stretch>
-            <a:fillRect/>
-          </a:stretch>
-        </p:blipFill>
-        <p:spPr>
-          <a:xfrm>
-            <a:off x="702731" y="2193224"/>
-            <a:ext cx="7738537" cy="2252656"/>
-          </a:xfrm>
-          <a:prstGeom prst="rect">
-            <a:avLst/>
-          </a:prstGeom>
-        </p:spPr>
-      </p:pic>
-    </p:spTree>
-    <p:extLst>
-      <p:ext uri="{BB962C8B-B14F-4D97-AF65-F5344CB8AC3E}">
-        <p14:creationId xmlns:p14="http://schemas.microsoft.com/office/powerpoint/2010/main" val="769228103"/>
-      </p:ext>
-    </p:extLst>
-  </p:cSld>
-  <p:clrMapOvr>
-    <a:masterClrMapping/>
-  </p:clrMapOvr>
-</p:sld>
-</file>
-
-<file path=ppt/slides/slide24.xml><?xml version="1.0" encoding="utf-8"?>
-<p:sld xmlns:a="http://schemas.openxmlformats.org/drawingml/2006/main" xmlns:r="http://schemas.openxmlformats.org/officeDocument/2006/relationships" xmlns:p="http://schemas.openxmlformats.org/presentationml/2006/main">
-  <p:cSld>
-    <p:spTree>
-      <p:nvGrpSpPr>
-        <p:cNvPr id="1" name=""/>
-        <p:cNvGrpSpPr/>
-        <p:nvPr/>
-      </p:nvGrpSpPr>
-      <p:grpSpPr>
-        <a:xfrm>
-          <a:off x="0" y="0"/>
-          <a:ext cx="0" cy="0"/>
-          <a:chOff x="0" y="0"/>
-          <a:chExt cx="0" cy="0"/>
-        </a:xfrm>
-      </p:grpSpPr>
-      <p:sp>
-        <p:nvSpPr>
-          <p:cNvPr id="2" name="Titolo 1">
-            <a:extLst>
-              <a:ext uri="{FF2B5EF4-FFF2-40B4-BE49-F238E27FC236}">
-                <a16:creationId xmlns:a16="http://schemas.microsoft.com/office/drawing/2014/main" id="{A1C33B46-A1F8-111B-8108-D696C1BBCC68}"/>
-              </a:ext>
-            </a:extLst>
-          </p:cNvPr>
-          <p:cNvSpPr>
-            <a:spLocks noGrp="1"/>
-          </p:cNvSpPr>
-          <p:nvPr>
-            <p:ph type="title"/>
-          </p:nvPr>
-        </p:nvSpPr>
-        <p:spPr/>
-        <p:txBody>
-          <a:bodyPr/>
-          <a:lstStyle/>
-          <a:p>
-            <a:r>
-              <a:rPr lang="it-IT" dirty="0"/>
-              <a:t>Esercizio 1(B): Cosa Stampa </a:t>
-            </a:r>
-          </a:p>
-        </p:txBody>
-      </p:sp>
-      <p:sp>
-        <p:nvSpPr>
-          <p:cNvPr id="4" name="Segnaposto numero diapositiva 3">
-            <a:extLst>
-              <a:ext uri="{FF2B5EF4-FFF2-40B4-BE49-F238E27FC236}">
-                <a16:creationId xmlns:a16="http://schemas.microsoft.com/office/drawing/2014/main" id="{30F37182-85E1-1CBA-A05A-CCEC4E40C29C}"/>
-              </a:ext>
-            </a:extLst>
-          </p:cNvPr>
-          <p:cNvSpPr>
-            <a:spLocks noGrp="1"/>
-          </p:cNvSpPr>
-          <p:nvPr>
-            <p:ph type="sldNum" sz="quarter" idx="4"/>
-          </p:nvPr>
-        </p:nvSpPr>
-        <p:spPr/>
-        <p:txBody>
-          <a:bodyPr/>
-          <a:lstStyle/>
-          <a:p>
-            <a:fld id="{4D021CEB-2F22-4EA1-9BAF-E3833982B82A}" type="slidenum">
-              <a:rPr lang="en-US" smtClean="0"/>
-              <a:pPr/>
-              <a:t>24</a:t>
-            </a:fld>
-            <a:r>
-              <a:rPr lang="en-US" dirty="0"/>
-              <a:t> di 35</a:t>
-            </a:r>
-          </a:p>
-        </p:txBody>
-      </p:sp>
-      <p:pic>
-        <p:nvPicPr>
-          <p:cNvPr id="5" name="Immagine 4">
-            <a:extLst>
-              <a:ext uri="{FF2B5EF4-FFF2-40B4-BE49-F238E27FC236}">
-                <a16:creationId xmlns:a16="http://schemas.microsoft.com/office/drawing/2014/main" id="{26D556AC-F096-685B-01B4-D7A51063E975}"/>
-              </a:ext>
-            </a:extLst>
-          </p:cNvPr>
-          <p:cNvPicPr>
-            <a:picLocks noChangeAspect="1"/>
-          </p:cNvPicPr>
-          <p:nvPr/>
-        </p:nvPicPr>
-        <p:blipFill>
-          <a:blip r:embed="rId2"/>
-          <a:stretch>
-            <a:fillRect/>
-          </a:stretch>
-        </p:blipFill>
-        <p:spPr>
-          <a:xfrm>
-            <a:off x="1035574" y="1412813"/>
-            <a:ext cx="2293819" cy="4480948"/>
-          </a:xfrm>
-          <a:prstGeom prst="rect">
-            <a:avLst/>
-          </a:prstGeom>
-        </p:spPr>
-      </p:pic>
-      <p:pic>
-        <p:nvPicPr>
-          <p:cNvPr id="7" name="Immagine 6">
-            <a:extLst>
-              <a:ext uri="{FF2B5EF4-FFF2-40B4-BE49-F238E27FC236}">
-                <a16:creationId xmlns:a16="http://schemas.microsoft.com/office/drawing/2014/main" id="{1013E9FE-AE34-5F0A-BBBE-9B8A05683E1C}"/>
-              </a:ext>
-            </a:extLst>
-          </p:cNvPr>
-          <p:cNvPicPr>
-            <a:picLocks noChangeAspect="1"/>
-          </p:cNvPicPr>
-          <p:nvPr/>
-        </p:nvPicPr>
-        <p:blipFill>
-          <a:blip r:embed="rId3"/>
-          <a:stretch>
-            <a:fillRect/>
-          </a:stretch>
-        </p:blipFill>
-        <p:spPr>
-          <a:xfrm>
-            <a:off x="4851515" y="2754049"/>
-            <a:ext cx="2209992" cy="1798476"/>
-          </a:xfrm>
-          <a:prstGeom prst="rect">
-            <a:avLst/>
-          </a:prstGeom>
-        </p:spPr>
-      </p:pic>
-    </p:spTree>
-    <p:extLst>
-      <p:ext uri="{BB962C8B-B14F-4D97-AF65-F5344CB8AC3E}">
-        <p14:creationId xmlns:p14="http://schemas.microsoft.com/office/powerpoint/2010/main" val="2404559827"/>
-      </p:ext>
-    </p:extLst>
-  </p:cSld>
-  <p:clrMapOvr>
-    <a:masterClrMapping/>
-  </p:clrMapOvr>
-</p:sld>
-</file>
-
 <file path=ppt/slides/slide25.xml><?xml version="1.0" encoding="utf-8"?>
 <p:sld xmlns:a="http://schemas.openxmlformats.org/drawingml/2006/main" xmlns:r="http://schemas.openxmlformats.org/officeDocument/2006/relationships" xmlns:p="http://schemas.openxmlformats.org/presentationml/2006/main">
   <p:cSld>
@@ -5163,7 +5239,7 @@
           <a:p>
             <a:r>
               <a:rPr lang="it-IT" dirty="0"/>
-              <a:t>Esercizio 1(B): Soluzione</a:t>
+              <a:t>Esercizio 2: Cosa Stampa </a:t>
             </a:r>
           </a:p>
         </p:txBody>
@@ -5206,7 +5282,7 @@
           <p:cNvPr id="5" name="Immagine 4">
             <a:extLst>
               <a:ext uri="{FF2B5EF4-FFF2-40B4-BE49-F238E27FC236}">
-                <a16:creationId xmlns:a16="http://schemas.microsoft.com/office/drawing/2014/main" id="{6459D024-3C3C-591D-D117-220DD94803EE}"/>
+                <a16:creationId xmlns:a16="http://schemas.microsoft.com/office/drawing/2014/main" id="{BAA96C7A-EFA2-E669-049D-A77A6808563A}"/>
               </a:ext>
             </a:extLst>
           </p:cNvPr>
@@ -5223,8 +5299,38 @@
         </p:blipFill>
         <p:spPr>
           <a:xfrm>
-            <a:off x="3029649" y="2416824"/>
-            <a:ext cx="2758676" cy="2024352"/>
+            <a:off x="422506" y="1382852"/>
+            <a:ext cx="4336107" cy="4512577"/>
+          </a:xfrm>
+          <a:prstGeom prst="rect">
+            <a:avLst/>
+          </a:prstGeom>
+        </p:spPr>
+      </p:pic>
+      <p:pic>
+        <p:nvPicPr>
+          <p:cNvPr id="7" name="Immagine 6">
+            <a:extLst>
+              <a:ext uri="{FF2B5EF4-FFF2-40B4-BE49-F238E27FC236}">
+                <a16:creationId xmlns:a16="http://schemas.microsoft.com/office/drawing/2014/main" id="{2CA4F46E-B4DB-5B7B-1D62-000B645B66AB}"/>
+              </a:ext>
+            </a:extLst>
+          </p:cNvPr>
+          <p:cNvPicPr>
+            <a:picLocks noChangeAspect="1"/>
+          </p:cNvPicPr>
+          <p:nvPr/>
+        </p:nvPicPr>
+        <p:blipFill>
+          <a:blip r:embed="rId3"/>
+          <a:stretch>
+            <a:fillRect/>
+          </a:stretch>
+        </p:blipFill>
+        <p:spPr>
+          <a:xfrm>
+            <a:off x="5404999" y="2432031"/>
+            <a:ext cx="2712634" cy="2475608"/>
           </a:xfrm>
           <a:prstGeom prst="rect">
             <a:avLst/>
@@ -5234,7 +5340,7 @@
     </p:spTree>
     <p:extLst>
       <p:ext uri="{BB962C8B-B14F-4D97-AF65-F5344CB8AC3E}">
-        <p14:creationId xmlns:p14="http://schemas.microsoft.com/office/powerpoint/2010/main" val="69511474"/>
+        <p14:creationId xmlns:p14="http://schemas.microsoft.com/office/powerpoint/2010/main" val="756874062"/>
       </p:ext>
     </p:extLst>
   </p:cSld>
@@ -5284,7 +5390,7 @@
           <a:p>
             <a:r>
               <a:rPr lang="it-IT" dirty="0"/>
-              <a:t>Esercizio 2: Cosa Stampa</a:t>
+              <a:t>Esercizio 2: Soluzione</a:t>
             </a:r>
           </a:p>
         </p:txBody>
@@ -5327,7 +5433,7 @@
           <p:cNvPr id="6" name="Immagine 5">
             <a:extLst>
               <a:ext uri="{FF2B5EF4-FFF2-40B4-BE49-F238E27FC236}">
-                <a16:creationId xmlns:a16="http://schemas.microsoft.com/office/drawing/2014/main" id="{EB233531-6D23-F119-28E2-5F17F95B4301}"/>
+                <a16:creationId xmlns:a16="http://schemas.microsoft.com/office/drawing/2014/main" id="{D357508B-A8C1-E7AB-F05D-D5102F15A2BD}"/>
               </a:ext>
             </a:extLst>
           </p:cNvPr>
@@ -5344,38 +5450,8 @@
         </p:blipFill>
         <p:spPr>
           <a:xfrm>
-            <a:off x="-50267" y="1909480"/>
-            <a:ext cx="4590212" cy="3431145"/>
-          </a:xfrm>
-          <a:prstGeom prst="rect">
-            <a:avLst/>
-          </a:prstGeom>
-        </p:spPr>
-      </p:pic>
-      <p:pic>
-        <p:nvPicPr>
-          <p:cNvPr id="10" name="Immagine 9">
-            <a:extLst>
-              <a:ext uri="{FF2B5EF4-FFF2-40B4-BE49-F238E27FC236}">
-                <a16:creationId xmlns:a16="http://schemas.microsoft.com/office/drawing/2014/main" id="{1586BC48-47A9-8AF1-9886-F76A86CD8FEA}"/>
-              </a:ext>
-            </a:extLst>
-          </p:cNvPr>
-          <p:cNvPicPr>
-            <a:picLocks noChangeAspect="1"/>
-          </p:cNvPicPr>
-          <p:nvPr/>
-        </p:nvPicPr>
-        <p:blipFill>
-          <a:blip r:embed="rId3"/>
-          <a:stretch>
-            <a:fillRect/>
-          </a:stretch>
-        </p:blipFill>
-        <p:spPr>
-          <a:xfrm>
-            <a:off x="4572000" y="2056129"/>
-            <a:ext cx="4539944" cy="2998076"/>
+            <a:off x="2415592" y="2091128"/>
+            <a:ext cx="4645915" cy="2910079"/>
           </a:xfrm>
           <a:prstGeom prst="rect">
             <a:avLst/>
@@ -5385,7 +5461,7 @@
     </p:spTree>
     <p:extLst>
       <p:ext uri="{BB962C8B-B14F-4D97-AF65-F5344CB8AC3E}">
-        <p14:creationId xmlns:p14="http://schemas.microsoft.com/office/powerpoint/2010/main" val="1499883676"/>
+        <p14:creationId xmlns:p14="http://schemas.microsoft.com/office/powerpoint/2010/main" val="3787288"/>
       </p:ext>
     </p:extLst>
   </p:cSld>
@@ -5430,12 +5506,14 @@
         </p:nvSpPr>
         <p:spPr/>
         <p:txBody>
-          <a:bodyPr/>
-          <a:lstStyle/>
-          <a:p>
-            <a:r>
-              <a:rPr lang="it-IT" dirty="0"/>
-              <a:t>Esercizio 2: Soluzione</a:t>
+          <a:bodyPr>
+            <a:noAutofit/>
+          </a:bodyPr>
+          <a:lstStyle/>
+          <a:p>
+            <a:r>
+              <a:rPr lang="it-IT" sz="3600" dirty="0"/>
+              <a:t>Gestione parte privata della classe</a:t>
             </a:r>
           </a:p>
         </p:txBody>
@@ -5473,12 +5551,56 @@
           </a:p>
         </p:txBody>
       </p:sp>
+      <p:sp>
+        <p:nvSpPr>
+          <p:cNvPr id="3" name="CasellaDiTesto 2">
+            <a:extLst>
+              <a:ext uri="{FF2B5EF4-FFF2-40B4-BE49-F238E27FC236}">
+                <a16:creationId xmlns:a16="http://schemas.microsoft.com/office/drawing/2014/main" id="{5AE5C1FD-6FDC-2143-543C-C4CFC7B4710A}"/>
+              </a:ext>
+            </a:extLst>
+          </p:cNvPr>
+          <p:cNvSpPr txBox="1"/>
+          <p:nvPr/>
+        </p:nvSpPr>
+        <p:spPr>
+          <a:xfrm>
+            <a:off x="790640" y="1380112"/>
+            <a:ext cx="7562720" cy="1477328"/>
+          </a:xfrm>
+          <a:prstGeom prst="rect">
+            <a:avLst/>
+          </a:prstGeom>
+          <a:noFill/>
+        </p:spPr>
+        <p:txBody>
+          <a:bodyPr wrap="square" rtlCol="0">
+            <a:spAutoFit/>
+          </a:bodyPr>
+          <a:lstStyle/>
+          <a:p>
+            <a:r>
+              <a:rPr lang="it-IT" dirty="0"/>
+              <a:t>Talvolta, potrebbe essere desiderabile nascondere la parte privata di una classe in modo che l'utente finale non abbia accesso diretto ad essa.</a:t>
+            </a:r>
+          </a:p>
+          <a:p>
+            <a:endParaRPr lang="it-IT" dirty="0"/>
+          </a:p>
+          <a:p>
+            <a:r>
+              <a:rPr lang="it-IT" dirty="0"/>
+              <a:t>Puoi definire una classe di gestione (handle) che conterrà la parte pubblica della classe.</a:t>
+            </a:r>
+          </a:p>
+        </p:txBody>
+      </p:sp>
       <p:pic>
         <p:nvPicPr>
-          <p:cNvPr id="5" name="Immagine 4">
-            <a:extLst>
-              <a:ext uri="{FF2B5EF4-FFF2-40B4-BE49-F238E27FC236}">
-                <a16:creationId xmlns:a16="http://schemas.microsoft.com/office/drawing/2014/main" id="{DB447F4A-22DD-A718-823E-3A5B2437D541}"/>
+          <p:cNvPr id="7" name="Immagine 6">
+            <a:extLst>
+              <a:ext uri="{FF2B5EF4-FFF2-40B4-BE49-F238E27FC236}">
+                <a16:creationId xmlns:a16="http://schemas.microsoft.com/office/drawing/2014/main" id="{CCE39CB4-B766-0CF7-EF89-CBD8A1353B38}"/>
               </a:ext>
             </a:extLst>
           </p:cNvPr>
@@ -5495,8 +5617,8 @@
         </p:blipFill>
         <p:spPr>
           <a:xfrm>
-            <a:off x="2208355" y="2252346"/>
-            <a:ext cx="4727290" cy="1806608"/>
+            <a:off x="1747151" y="3123127"/>
+            <a:ext cx="5028475" cy="2232644"/>
           </a:xfrm>
           <a:prstGeom prst="rect">
             <a:avLst/>
@@ -5506,7 +5628,7 @@
     </p:spTree>
     <p:extLst>
       <p:ext uri="{BB962C8B-B14F-4D97-AF65-F5344CB8AC3E}">
-        <p14:creationId xmlns:p14="http://schemas.microsoft.com/office/powerpoint/2010/main" val="660754846"/>
+        <p14:creationId xmlns:p14="http://schemas.microsoft.com/office/powerpoint/2010/main" val="790277981"/>
       </p:ext>
     </p:extLst>
   </p:cSld>
@@ -5558,7 +5680,7 @@
           <a:p>
             <a:r>
               <a:rPr lang="it-IT" sz="3600" dirty="0"/>
-              <a:t>Gestione parte privata della classe</a:t>
+              <a:t>Dichiarazione incompleta della classe</a:t>
             </a:r>
           </a:p>
         </p:txBody>
@@ -5611,7 +5733,7 @@
         <p:spPr>
           <a:xfrm>
             <a:off x="790640" y="1380112"/>
-            <a:ext cx="7562720" cy="1477328"/>
+            <a:ext cx="7562720" cy="923330"/>
           </a:xfrm>
           <a:prstGeom prst="rect">
             <a:avLst/>
@@ -5626,26 +5748,17 @@
           <a:p>
             <a:r>
               <a:rPr lang="it-IT" dirty="0"/>
-              <a:t>Talvolta, potrebbe essere desiderabile nascondere la parte privata di una classe in modo che l'utente finale non abbia accesso diretto ad essa.</a:t>
-            </a:r>
-          </a:p>
-          <a:p>
-            <a:endParaRPr lang="it-IT" dirty="0"/>
-          </a:p>
-          <a:p>
-            <a:r>
-              <a:rPr lang="it-IT" dirty="0"/>
-              <a:t>Puoi definire una classe di gestione (handle) che conterrà la parte pubblica della classe.</a:t>
+              <a:t>Serve a fornire un'informazione di base sul nome della classe e a consentire l'utilizzo di puntatori o riferimenti a oggetti di quella classe prima che la sua definizione completa sia disponibile.</a:t>
             </a:r>
           </a:p>
         </p:txBody>
       </p:sp>
       <p:pic>
         <p:nvPicPr>
-          <p:cNvPr id="7" name="Immagine 6">
-            <a:extLst>
-              <a:ext uri="{FF2B5EF4-FFF2-40B4-BE49-F238E27FC236}">
-                <a16:creationId xmlns:a16="http://schemas.microsoft.com/office/drawing/2014/main" id="{CCE39CB4-B766-0CF7-EF89-CBD8A1353B38}"/>
+          <p:cNvPr id="6" name="Immagine 5">
+            <a:extLst>
+              <a:ext uri="{FF2B5EF4-FFF2-40B4-BE49-F238E27FC236}">
+                <a16:creationId xmlns:a16="http://schemas.microsoft.com/office/drawing/2014/main" id="{B900663C-020D-15A4-F5C0-DA9ED781A41D}"/>
               </a:ext>
             </a:extLst>
           </p:cNvPr>
@@ -5662,8 +5775,8 @@
         </p:blipFill>
         <p:spPr>
           <a:xfrm>
-            <a:off x="2045731" y="3123127"/>
-            <a:ext cx="4544849" cy="2017914"/>
+            <a:off x="1116448" y="2569129"/>
+            <a:ext cx="6911104" cy="3262504"/>
           </a:xfrm>
           <a:prstGeom prst="rect">
             <a:avLst/>
@@ -5673,7 +5786,7 @@
     </p:spTree>
     <p:extLst>
       <p:ext uri="{BB962C8B-B14F-4D97-AF65-F5344CB8AC3E}">
-        <p14:creationId xmlns:p14="http://schemas.microsoft.com/office/powerpoint/2010/main" val="790277981"/>
+        <p14:creationId xmlns:p14="http://schemas.microsoft.com/office/powerpoint/2010/main" val="3936829590"/>
       </p:ext>
     </p:extLst>
   </p:cSld>
@@ -5725,7 +5838,7 @@
           <a:p>
             <a:r>
               <a:rPr lang="it-IT" sz="3600" dirty="0"/>
-              <a:t>Dichiarazione incompleta della classe</a:t>
+              <a:t>Friend</a:t>
             </a:r>
           </a:p>
         </p:txBody>
@@ -5777,8 +5890,8 @@
         </p:nvSpPr>
         <p:spPr>
           <a:xfrm>
-            <a:off x="790640" y="1380112"/>
-            <a:ext cx="7562720" cy="923330"/>
+            <a:off x="522514" y="1196324"/>
+            <a:ext cx="8192278" cy="1200329"/>
           </a:xfrm>
           <a:prstGeom prst="rect">
             <a:avLst/>
@@ -5793,17 +5906,37 @@
           <a:p>
             <a:r>
               <a:rPr lang="it-IT" dirty="0"/>
-              <a:t>Serve a fornire un'informazione di base sul nome della classe e a consentire l'utilizzo di puntatori o riferimenti a oggetti di quella classe prima che la sua definizione completa sia disponibile.</a:t>
+              <a:t>Piuttosto che definire una classe incompleta o un puntatore specifico, possiamo usare la keyword </a:t>
+            </a:r>
+            <a:r>
+              <a:rPr lang="it-IT" dirty="0">
+                <a:latin typeface="Courier New" panose="02070309020205020404" pitchFamily="49" charset="0"/>
+                <a:cs typeface="Courier New" panose="02070309020205020404" pitchFamily="49" charset="0"/>
+              </a:rPr>
+              <a:t>friend</a:t>
+            </a:r>
+            <a:r>
+              <a:rPr lang="it-IT" dirty="0"/>
+              <a:t> per dichiarare l’accesso alla parte privata o protetta della classe.</a:t>
+            </a:r>
+          </a:p>
+          <a:p>
+            <a:endParaRPr lang="it-IT" dirty="0"/>
+          </a:p>
+          <a:p>
+            <a:r>
+              <a:rPr lang="it-IT" dirty="0"/>
+              <a:t>Questo ci serve per accedere a tutti gli elementi della collezione nel nostro caso</a:t>
             </a:r>
           </a:p>
         </p:txBody>
       </p:sp>
       <p:pic>
         <p:nvPicPr>
-          <p:cNvPr id="6" name="Immagine 5">
-            <a:extLst>
-              <a:ext uri="{FF2B5EF4-FFF2-40B4-BE49-F238E27FC236}">
-                <a16:creationId xmlns:a16="http://schemas.microsoft.com/office/drawing/2014/main" id="{B900663C-020D-15A4-F5C0-DA9ED781A41D}"/>
+          <p:cNvPr id="13" name="Immagine 12">
+            <a:extLst>
+              <a:ext uri="{FF2B5EF4-FFF2-40B4-BE49-F238E27FC236}">
+                <a16:creationId xmlns:a16="http://schemas.microsoft.com/office/drawing/2014/main" id="{0ABC0270-1FB4-7BDF-E76E-4372179DF932}"/>
               </a:ext>
             </a:extLst>
           </p:cNvPr>
@@ -5820,8 +5953,8 @@
         </p:blipFill>
         <p:spPr>
           <a:xfrm>
-            <a:off x="1442130" y="2569129"/>
-            <a:ext cx="6259739" cy="2955016"/>
+            <a:off x="1441752" y="2478552"/>
+            <a:ext cx="6260496" cy="3600641"/>
           </a:xfrm>
           <a:prstGeom prst="rect">
             <a:avLst/>
@@ -5831,7 +5964,7 @@
     </p:spTree>
     <p:extLst>
       <p:ext uri="{BB962C8B-B14F-4D97-AF65-F5344CB8AC3E}">
-        <p14:creationId xmlns:p14="http://schemas.microsoft.com/office/powerpoint/2010/main" val="3936829590"/>
+        <p14:creationId xmlns:p14="http://schemas.microsoft.com/office/powerpoint/2010/main" val="1701169545"/>
       </p:ext>
     </p:extLst>
   </p:cSld>
@@ -6004,7 +6137,7 @@
           <a:p>
             <a:r>
               <a:rPr lang="it-IT" sz="3600" dirty="0"/>
-              <a:t>Friend</a:t>
+              <a:t>Esempio uso classi iteratore</a:t>
             </a:r>
           </a:p>
         </p:txBody>
@@ -6034,307 +6167,6 @@
               <a:rPr lang="en-US" smtClean="0"/>
               <a:pPr/>
               <a:t>30</a:t>
-            </a:fld>
-            <a:r>
-              <a:rPr lang="en-US" dirty="0"/>
-              <a:t> di 35</a:t>
-            </a:r>
-          </a:p>
-        </p:txBody>
-      </p:sp>
-      <p:sp>
-        <p:nvSpPr>
-          <p:cNvPr id="3" name="CasellaDiTesto 2">
-            <a:extLst>
-              <a:ext uri="{FF2B5EF4-FFF2-40B4-BE49-F238E27FC236}">
-                <a16:creationId xmlns:a16="http://schemas.microsoft.com/office/drawing/2014/main" id="{5AE5C1FD-6FDC-2143-543C-C4CFC7B4710A}"/>
-              </a:ext>
-            </a:extLst>
-          </p:cNvPr>
-          <p:cNvSpPr txBox="1"/>
-          <p:nvPr/>
-        </p:nvSpPr>
-        <p:spPr>
-          <a:xfrm>
-            <a:off x="790640" y="1354233"/>
-            <a:ext cx="7562720" cy="1754326"/>
-          </a:xfrm>
-          <a:prstGeom prst="rect">
-            <a:avLst/>
-          </a:prstGeom>
-          <a:noFill/>
-        </p:spPr>
-        <p:txBody>
-          <a:bodyPr wrap="square" rtlCol="0">
-            <a:spAutoFit/>
-          </a:bodyPr>
-          <a:lstStyle/>
-          <a:p>
-            <a:r>
-              <a:rPr lang="it-IT" dirty="0"/>
-              <a:t>Piuttosto che definire una classe incompleta o un puntatore specifico, possiamo usare la keyword </a:t>
-            </a:r>
-            <a:r>
-              <a:rPr lang="it-IT" dirty="0">
-                <a:latin typeface="Courier New" panose="02070309020205020404" pitchFamily="49" charset="0"/>
-                <a:cs typeface="Courier New" panose="02070309020205020404" pitchFamily="49" charset="0"/>
-              </a:rPr>
-              <a:t>friend</a:t>
-            </a:r>
-            <a:r>
-              <a:rPr lang="it-IT" dirty="0"/>
-              <a:t> per dichiarare l’accesso alla parte privata o protetta della classe.</a:t>
-            </a:r>
-          </a:p>
-          <a:p>
-            <a:endParaRPr lang="it-IT" dirty="0"/>
-          </a:p>
-          <a:p>
-            <a:r>
-              <a:rPr lang="it-IT" dirty="0"/>
-              <a:t>Questo ci serve per accedere a tutti gli elementi della collezione nel nostro caso</a:t>
-            </a:r>
-          </a:p>
-        </p:txBody>
-      </p:sp>
-      <p:pic>
-        <p:nvPicPr>
-          <p:cNvPr id="13" name="Immagine 12">
-            <a:extLst>
-              <a:ext uri="{FF2B5EF4-FFF2-40B4-BE49-F238E27FC236}">
-                <a16:creationId xmlns:a16="http://schemas.microsoft.com/office/drawing/2014/main" id="{0ABC0270-1FB4-7BDF-E76E-4372179DF932}"/>
-              </a:ext>
-            </a:extLst>
-          </p:cNvPr>
-          <p:cNvPicPr>
-            <a:picLocks noChangeAspect="1"/>
-          </p:cNvPicPr>
-          <p:nvPr/>
-        </p:nvPicPr>
-        <p:blipFill>
-          <a:blip r:embed="rId2"/>
-          <a:stretch>
-            <a:fillRect/>
-          </a:stretch>
-        </p:blipFill>
-        <p:spPr>
-          <a:xfrm>
-            <a:off x="1782838" y="3032549"/>
-            <a:ext cx="5437471" cy="3127289"/>
-          </a:xfrm>
-          <a:prstGeom prst="rect">
-            <a:avLst/>
-          </a:prstGeom>
-        </p:spPr>
-      </p:pic>
-    </p:spTree>
-    <p:extLst>
-      <p:ext uri="{BB962C8B-B14F-4D97-AF65-F5344CB8AC3E}">
-        <p14:creationId xmlns:p14="http://schemas.microsoft.com/office/powerpoint/2010/main" val="1701169545"/>
-      </p:ext>
-    </p:extLst>
-  </p:cSld>
-  <p:clrMapOvr>
-    <a:masterClrMapping/>
-  </p:clrMapOvr>
-</p:sld>
-</file>
-
-<file path=ppt/slides/slide31.xml><?xml version="1.0" encoding="utf-8"?>
-<p:sld xmlns:a="http://schemas.openxmlformats.org/drawingml/2006/main" xmlns:r="http://schemas.openxmlformats.org/officeDocument/2006/relationships" xmlns:p="http://schemas.openxmlformats.org/presentationml/2006/main">
-  <p:cSld>
-    <p:spTree>
-      <p:nvGrpSpPr>
-        <p:cNvPr id="1" name=""/>
-        <p:cNvGrpSpPr/>
-        <p:nvPr/>
-      </p:nvGrpSpPr>
-      <p:grpSpPr>
-        <a:xfrm>
-          <a:off x="0" y="0"/>
-          <a:ext cx="0" cy="0"/>
-          <a:chOff x="0" y="0"/>
-          <a:chExt cx="0" cy="0"/>
-        </a:xfrm>
-      </p:grpSpPr>
-      <p:sp>
-        <p:nvSpPr>
-          <p:cNvPr id="2" name="Titolo 1">
-            <a:extLst>
-              <a:ext uri="{FF2B5EF4-FFF2-40B4-BE49-F238E27FC236}">
-                <a16:creationId xmlns:a16="http://schemas.microsoft.com/office/drawing/2014/main" id="{A1C33B46-A1F8-111B-8108-D696C1BBCC68}"/>
-              </a:ext>
-            </a:extLst>
-          </p:cNvPr>
-          <p:cNvSpPr>
-            <a:spLocks noGrp="1"/>
-          </p:cNvSpPr>
-          <p:nvPr>
-            <p:ph type="title"/>
-          </p:nvPr>
-        </p:nvSpPr>
-        <p:spPr/>
-        <p:txBody>
-          <a:bodyPr>
-            <a:noAutofit/>
-          </a:bodyPr>
-          <a:lstStyle/>
-          <a:p>
-            <a:r>
-              <a:rPr lang="it-IT" sz="3600" dirty="0"/>
-              <a:t>Esempio uso classi iteratore</a:t>
-            </a:r>
-          </a:p>
-        </p:txBody>
-      </p:sp>
-      <p:sp>
-        <p:nvSpPr>
-          <p:cNvPr id="4" name="Segnaposto numero diapositiva 3">
-            <a:extLst>
-              <a:ext uri="{FF2B5EF4-FFF2-40B4-BE49-F238E27FC236}">
-                <a16:creationId xmlns:a16="http://schemas.microsoft.com/office/drawing/2014/main" id="{30F37182-85E1-1CBA-A05A-CCEC4E40C29C}"/>
-              </a:ext>
-            </a:extLst>
-          </p:cNvPr>
-          <p:cNvSpPr>
-            <a:spLocks noGrp="1"/>
-          </p:cNvSpPr>
-          <p:nvPr>
-            <p:ph type="sldNum" sz="quarter" idx="4"/>
-          </p:nvPr>
-        </p:nvSpPr>
-        <p:spPr/>
-        <p:txBody>
-          <a:bodyPr/>
-          <a:lstStyle/>
-          <a:p>
-            <a:fld id="{4D021CEB-2F22-4EA1-9BAF-E3833982B82A}" type="slidenum">
-              <a:rPr lang="en-US" smtClean="0"/>
-              <a:pPr/>
-              <a:t>31</a:t>
-            </a:fld>
-            <a:r>
-              <a:rPr lang="en-US" dirty="0"/>
-              <a:t> di 35</a:t>
-            </a:r>
-          </a:p>
-        </p:txBody>
-      </p:sp>
-      <p:pic>
-        <p:nvPicPr>
-          <p:cNvPr id="6" name="Immagine 5">
-            <a:extLst>
-              <a:ext uri="{FF2B5EF4-FFF2-40B4-BE49-F238E27FC236}">
-                <a16:creationId xmlns:a16="http://schemas.microsoft.com/office/drawing/2014/main" id="{56EE7C9A-393D-5728-077C-D2284F487367}"/>
-              </a:ext>
-            </a:extLst>
-          </p:cNvPr>
-          <p:cNvPicPr>
-            <a:picLocks noChangeAspect="1"/>
-          </p:cNvPicPr>
-          <p:nvPr/>
-        </p:nvPicPr>
-        <p:blipFill>
-          <a:blip r:embed="rId2"/>
-          <a:stretch>
-            <a:fillRect/>
-          </a:stretch>
-        </p:blipFill>
-        <p:spPr>
-          <a:xfrm>
-            <a:off x="2161106" y="1718741"/>
-            <a:ext cx="4438101" cy="3731452"/>
-          </a:xfrm>
-          <a:prstGeom prst="rect">
-            <a:avLst/>
-          </a:prstGeom>
-        </p:spPr>
-      </p:pic>
-    </p:spTree>
-    <p:extLst>
-      <p:ext uri="{BB962C8B-B14F-4D97-AF65-F5344CB8AC3E}">
-        <p14:creationId xmlns:p14="http://schemas.microsoft.com/office/powerpoint/2010/main" val="2849838069"/>
-      </p:ext>
-    </p:extLst>
-  </p:cSld>
-  <p:clrMapOvr>
-    <a:masterClrMapping/>
-  </p:clrMapOvr>
-</p:sld>
-</file>
-
-<file path=ppt/slides/slide32.xml><?xml version="1.0" encoding="utf-8"?>
-<p:sld xmlns:a="http://schemas.openxmlformats.org/drawingml/2006/main" xmlns:r="http://schemas.openxmlformats.org/officeDocument/2006/relationships" xmlns:p="http://schemas.openxmlformats.org/presentationml/2006/main">
-  <p:cSld>
-    <p:spTree>
-      <p:nvGrpSpPr>
-        <p:cNvPr id="1" name=""/>
-        <p:cNvGrpSpPr/>
-        <p:nvPr/>
-      </p:nvGrpSpPr>
-      <p:grpSpPr>
-        <a:xfrm>
-          <a:off x="0" y="0"/>
-          <a:ext cx="0" cy="0"/>
-          <a:chOff x="0" y="0"/>
-          <a:chExt cx="0" cy="0"/>
-        </a:xfrm>
-      </p:grpSpPr>
-      <p:sp>
-        <p:nvSpPr>
-          <p:cNvPr id="2" name="Titolo 1">
-            <a:extLst>
-              <a:ext uri="{FF2B5EF4-FFF2-40B4-BE49-F238E27FC236}">
-                <a16:creationId xmlns:a16="http://schemas.microsoft.com/office/drawing/2014/main" id="{A1C33B46-A1F8-111B-8108-D696C1BBCC68}"/>
-              </a:ext>
-            </a:extLst>
-          </p:cNvPr>
-          <p:cNvSpPr>
-            <a:spLocks noGrp="1"/>
-          </p:cNvSpPr>
-          <p:nvPr>
-            <p:ph type="title"/>
-          </p:nvPr>
-        </p:nvSpPr>
-        <p:spPr/>
-        <p:txBody>
-          <a:bodyPr>
-            <a:noAutofit/>
-          </a:bodyPr>
-          <a:lstStyle/>
-          <a:p>
-            <a:r>
-              <a:rPr lang="it-IT" sz="3600" dirty="0"/>
-              <a:t>Esempio uso classi iteratore</a:t>
-            </a:r>
-          </a:p>
-        </p:txBody>
-      </p:sp>
-      <p:sp>
-        <p:nvSpPr>
-          <p:cNvPr id="4" name="Segnaposto numero diapositiva 3">
-            <a:extLst>
-              <a:ext uri="{FF2B5EF4-FFF2-40B4-BE49-F238E27FC236}">
-                <a16:creationId xmlns:a16="http://schemas.microsoft.com/office/drawing/2014/main" id="{30F37182-85E1-1CBA-A05A-CCEC4E40C29C}"/>
-              </a:ext>
-            </a:extLst>
-          </p:cNvPr>
-          <p:cNvSpPr>
-            <a:spLocks noGrp="1"/>
-          </p:cNvSpPr>
-          <p:nvPr>
-            <p:ph type="sldNum" sz="quarter" idx="4"/>
-          </p:nvPr>
-        </p:nvSpPr>
-        <p:spPr/>
-        <p:txBody>
-          <a:bodyPr/>
-          <a:lstStyle/>
-          <a:p>
-            <a:fld id="{4D021CEB-2F22-4EA1-9BAF-E3833982B82A}" type="slidenum">
-              <a:rPr lang="en-US" smtClean="0"/>
-              <a:pPr/>
-              <a:t>32</a:t>
             </a:fld>
             <a:r>
               <a:rPr lang="en-US" dirty="0"/>
@@ -6416,6 +6248,389 @@
 </p:sld>
 </file>
 
+<file path=ppt/slides/slide31.xml><?xml version="1.0" encoding="utf-8"?>
+<p:sld xmlns:a="http://schemas.openxmlformats.org/drawingml/2006/main" xmlns:r="http://schemas.openxmlformats.org/officeDocument/2006/relationships" xmlns:p="http://schemas.openxmlformats.org/presentationml/2006/main">
+  <p:cSld>
+    <p:spTree>
+      <p:nvGrpSpPr>
+        <p:cNvPr id="1" name=""/>
+        <p:cNvGrpSpPr/>
+        <p:nvPr/>
+      </p:nvGrpSpPr>
+      <p:grpSpPr>
+        <a:xfrm>
+          <a:off x="0" y="0"/>
+          <a:ext cx="0" cy="0"/>
+          <a:chOff x="0" y="0"/>
+          <a:chExt cx="0" cy="0"/>
+        </a:xfrm>
+      </p:grpSpPr>
+      <p:sp>
+        <p:nvSpPr>
+          <p:cNvPr id="2" name="Titolo 1">
+            <a:extLst>
+              <a:ext uri="{FF2B5EF4-FFF2-40B4-BE49-F238E27FC236}">
+                <a16:creationId xmlns:a16="http://schemas.microsoft.com/office/drawing/2014/main" id="{A1C33B46-A1F8-111B-8108-D696C1BBCC68}"/>
+              </a:ext>
+            </a:extLst>
+          </p:cNvPr>
+          <p:cNvSpPr>
+            <a:spLocks noGrp="1"/>
+          </p:cNvSpPr>
+          <p:nvPr>
+            <p:ph type="title"/>
+          </p:nvPr>
+        </p:nvSpPr>
+        <p:spPr/>
+        <p:txBody>
+          <a:bodyPr>
+            <a:noAutofit/>
+          </a:bodyPr>
+          <a:lstStyle/>
+          <a:p>
+            <a:r>
+              <a:rPr lang="it-IT" sz="3600" dirty="0"/>
+              <a:t>Esercizio 3: Modellazione</a:t>
+            </a:r>
+          </a:p>
+        </p:txBody>
+      </p:sp>
+      <p:sp>
+        <p:nvSpPr>
+          <p:cNvPr id="4" name="Segnaposto numero diapositiva 3">
+            <a:extLst>
+              <a:ext uri="{FF2B5EF4-FFF2-40B4-BE49-F238E27FC236}">
+                <a16:creationId xmlns:a16="http://schemas.microsoft.com/office/drawing/2014/main" id="{30F37182-85E1-1CBA-A05A-CCEC4E40C29C}"/>
+              </a:ext>
+            </a:extLst>
+          </p:cNvPr>
+          <p:cNvSpPr>
+            <a:spLocks noGrp="1"/>
+          </p:cNvSpPr>
+          <p:nvPr>
+            <p:ph type="sldNum" sz="quarter" idx="4"/>
+          </p:nvPr>
+        </p:nvSpPr>
+        <p:spPr/>
+        <p:txBody>
+          <a:bodyPr/>
+          <a:lstStyle/>
+          <a:p>
+            <a:fld id="{4D021CEB-2F22-4EA1-9BAF-E3833982B82A}" type="slidenum">
+              <a:rPr lang="en-US" smtClean="0"/>
+              <a:pPr/>
+              <a:t>31</a:t>
+            </a:fld>
+            <a:r>
+              <a:rPr lang="en-US" dirty="0"/>
+              <a:t> di 35</a:t>
+            </a:r>
+          </a:p>
+        </p:txBody>
+      </p:sp>
+      <p:pic>
+        <p:nvPicPr>
+          <p:cNvPr id="5" name="Immagine 4">
+            <a:extLst>
+              <a:ext uri="{FF2B5EF4-FFF2-40B4-BE49-F238E27FC236}">
+                <a16:creationId xmlns:a16="http://schemas.microsoft.com/office/drawing/2014/main" id="{86C7C9FE-8220-7C5A-BB58-AC52F684F83C}"/>
+              </a:ext>
+            </a:extLst>
+          </p:cNvPr>
+          <p:cNvPicPr>
+            <a:picLocks noChangeAspect="1"/>
+          </p:cNvPicPr>
+          <p:nvPr/>
+        </p:nvPicPr>
+        <p:blipFill>
+          <a:blip r:embed="rId2"/>
+          <a:stretch>
+            <a:fillRect/>
+          </a:stretch>
+        </p:blipFill>
+        <p:spPr>
+          <a:xfrm>
+            <a:off x="625148" y="3429000"/>
+            <a:ext cx="8057707" cy="2339002"/>
+          </a:xfrm>
+          <a:prstGeom prst="rect">
+            <a:avLst/>
+          </a:prstGeom>
+        </p:spPr>
+      </p:pic>
+      <p:pic>
+        <p:nvPicPr>
+          <p:cNvPr id="1026" name="Picture 2" descr="Persona - Icone Interfaccia utente e gesti">
+            <a:extLst>
+              <a:ext uri="{FF2B5EF4-FFF2-40B4-BE49-F238E27FC236}">
+                <a16:creationId xmlns:a16="http://schemas.microsoft.com/office/drawing/2014/main" id="{34BD02D6-49C1-4F4F-28CE-2BDFBD5ACB74}"/>
+              </a:ext>
+            </a:extLst>
+          </p:cNvPr>
+          <p:cNvPicPr>
+            <a:picLocks noChangeAspect="1" noChangeArrowheads="1"/>
+          </p:cNvPicPr>
+          <p:nvPr/>
+        </p:nvPicPr>
+        <p:blipFill>
+          <a:blip r:embed="rId3">
+            <a:extLst>
+              <a:ext uri="{28A0092B-C50C-407E-A947-70E740481C1C}">
+                <a14:useLocalDpi xmlns:a14="http://schemas.microsoft.com/office/drawing/2010/main" val="0"/>
+              </a:ext>
+            </a:extLst>
+          </a:blip>
+          <a:srcRect/>
+          <a:stretch>
+            <a:fillRect/>
+          </a:stretch>
+        </p:blipFill>
+        <p:spPr bwMode="auto">
+          <a:xfrm>
+            <a:off x="3633078" y="1269287"/>
+            <a:ext cx="2041849" cy="2041849"/>
+          </a:xfrm>
+          <a:prstGeom prst="rect">
+            <a:avLst/>
+          </a:prstGeom>
+          <a:noFill/>
+          <a:extLst>
+            <a:ext uri="{909E8E84-426E-40DD-AFC4-6F175D3DCCD1}">
+              <a14:hiddenFill xmlns:a14="http://schemas.microsoft.com/office/drawing/2010/main">
+                <a:solidFill>
+                  <a:srgbClr val="FFFFFF"/>
+                </a:solidFill>
+              </a14:hiddenFill>
+            </a:ext>
+          </a:extLst>
+        </p:spPr>
+      </p:pic>
+    </p:spTree>
+    <p:extLst>
+      <p:ext uri="{BB962C8B-B14F-4D97-AF65-F5344CB8AC3E}">
+        <p14:creationId xmlns:p14="http://schemas.microsoft.com/office/powerpoint/2010/main" val="2940009884"/>
+      </p:ext>
+    </p:extLst>
+  </p:cSld>
+  <p:clrMapOvr>
+    <a:masterClrMapping/>
+  </p:clrMapOvr>
+</p:sld>
+</file>
+
+<file path=ppt/slides/slide32.xml><?xml version="1.0" encoding="utf-8"?>
+<p:sld xmlns:a="http://schemas.openxmlformats.org/drawingml/2006/main" xmlns:r="http://schemas.openxmlformats.org/officeDocument/2006/relationships" xmlns:p="http://schemas.openxmlformats.org/presentationml/2006/main">
+  <p:cSld>
+    <p:spTree>
+      <p:nvGrpSpPr>
+        <p:cNvPr id="1" name=""/>
+        <p:cNvGrpSpPr/>
+        <p:nvPr/>
+      </p:nvGrpSpPr>
+      <p:grpSpPr>
+        <a:xfrm>
+          <a:off x="0" y="0"/>
+          <a:ext cx="0" cy="0"/>
+          <a:chOff x="0" y="0"/>
+          <a:chExt cx="0" cy="0"/>
+        </a:xfrm>
+      </p:grpSpPr>
+      <p:sp>
+        <p:nvSpPr>
+          <p:cNvPr id="2" name="Titolo 1">
+            <a:extLst>
+              <a:ext uri="{FF2B5EF4-FFF2-40B4-BE49-F238E27FC236}">
+                <a16:creationId xmlns:a16="http://schemas.microsoft.com/office/drawing/2014/main" id="{A1C33B46-A1F8-111B-8108-D696C1BBCC68}"/>
+              </a:ext>
+            </a:extLst>
+          </p:cNvPr>
+          <p:cNvSpPr>
+            <a:spLocks noGrp="1"/>
+          </p:cNvSpPr>
+          <p:nvPr>
+            <p:ph type="title"/>
+          </p:nvPr>
+        </p:nvSpPr>
+        <p:spPr/>
+        <p:txBody>
+          <a:bodyPr>
+            <a:noAutofit/>
+          </a:bodyPr>
+          <a:lstStyle/>
+          <a:p>
+            <a:r>
+              <a:rPr lang="it-IT" sz="3600" dirty="0"/>
+              <a:t>Esercizio 4: Cosa Stampa</a:t>
+            </a:r>
+          </a:p>
+        </p:txBody>
+      </p:sp>
+      <p:sp>
+        <p:nvSpPr>
+          <p:cNvPr id="4" name="Segnaposto numero diapositiva 3">
+            <a:extLst>
+              <a:ext uri="{FF2B5EF4-FFF2-40B4-BE49-F238E27FC236}">
+                <a16:creationId xmlns:a16="http://schemas.microsoft.com/office/drawing/2014/main" id="{30F37182-85E1-1CBA-A05A-CCEC4E40C29C}"/>
+              </a:ext>
+            </a:extLst>
+          </p:cNvPr>
+          <p:cNvSpPr>
+            <a:spLocks noGrp="1"/>
+          </p:cNvSpPr>
+          <p:nvPr>
+            <p:ph type="sldNum" sz="quarter" idx="4"/>
+          </p:nvPr>
+        </p:nvSpPr>
+        <p:spPr/>
+        <p:txBody>
+          <a:bodyPr/>
+          <a:lstStyle/>
+          <a:p>
+            <a:fld id="{4D021CEB-2F22-4EA1-9BAF-E3833982B82A}" type="slidenum">
+              <a:rPr lang="en-US" smtClean="0"/>
+              <a:pPr/>
+              <a:t>32</a:t>
+            </a:fld>
+            <a:r>
+              <a:rPr lang="en-US" dirty="0"/>
+              <a:t> di 35</a:t>
+            </a:r>
+          </a:p>
+        </p:txBody>
+      </p:sp>
+      <p:pic>
+        <p:nvPicPr>
+          <p:cNvPr id="18" name="Immagine 17">
+            <a:extLst>
+              <a:ext uri="{FF2B5EF4-FFF2-40B4-BE49-F238E27FC236}">
+                <a16:creationId xmlns:a16="http://schemas.microsoft.com/office/drawing/2014/main" id="{83A1130E-FFE8-4452-CFB0-273A565C27DD}"/>
+              </a:ext>
+            </a:extLst>
+          </p:cNvPr>
+          <p:cNvPicPr>
+            <a:picLocks noChangeAspect="1"/>
+          </p:cNvPicPr>
+          <p:nvPr/>
+        </p:nvPicPr>
+        <p:blipFill>
+          <a:blip r:embed="rId2"/>
+          <a:stretch>
+            <a:fillRect/>
+          </a:stretch>
+        </p:blipFill>
+        <p:spPr>
+          <a:xfrm>
+            <a:off x="186360" y="1225487"/>
+            <a:ext cx="3827726" cy="2654094"/>
+          </a:xfrm>
+          <a:prstGeom prst="rect">
+            <a:avLst/>
+          </a:prstGeom>
+        </p:spPr>
+      </p:pic>
+      <p:pic>
+        <p:nvPicPr>
+          <p:cNvPr id="20" name="Immagine 19">
+            <a:extLst>
+              <a:ext uri="{FF2B5EF4-FFF2-40B4-BE49-F238E27FC236}">
+                <a16:creationId xmlns:a16="http://schemas.microsoft.com/office/drawing/2014/main" id="{7E39F6DA-86AB-180C-0F18-99AE6530EBB8}"/>
+              </a:ext>
+            </a:extLst>
+          </p:cNvPr>
+          <p:cNvPicPr>
+            <a:picLocks noChangeAspect="1"/>
+          </p:cNvPicPr>
+          <p:nvPr/>
+        </p:nvPicPr>
+        <p:blipFill>
+          <a:blip r:embed="rId3"/>
+          <a:stretch>
+            <a:fillRect/>
+          </a:stretch>
+        </p:blipFill>
+        <p:spPr>
+          <a:xfrm>
+            <a:off x="4841470" y="4548399"/>
+            <a:ext cx="3566469" cy="1729890"/>
+          </a:xfrm>
+          <a:prstGeom prst="rect">
+            <a:avLst/>
+          </a:prstGeom>
+        </p:spPr>
+      </p:pic>
+      <p:pic>
+        <p:nvPicPr>
+          <p:cNvPr id="22" name="Immagine 21">
+            <a:extLst>
+              <a:ext uri="{FF2B5EF4-FFF2-40B4-BE49-F238E27FC236}">
+                <a16:creationId xmlns:a16="http://schemas.microsoft.com/office/drawing/2014/main" id="{A43CA51B-3FB9-A4A1-DBC9-5CADA7E9C6A0}"/>
+              </a:ext>
+            </a:extLst>
+          </p:cNvPr>
+          <p:cNvPicPr>
+            <a:picLocks noChangeAspect="1"/>
+          </p:cNvPicPr>
+          <p:nvPr/>
+        </p:nvPicPr>
+        <p:blipFill>
+          <a:blip r:embed="rId4"/>
+          <a:stretch>
+            <a:fillRect/>
+          </a:stretch>
+        </p:blipFill>
+        <p:spPr>
+          <a:xfrm>
+            <a:off x="186360" y="3990644"/>
+            <a:ext cx="4168372" cy="2541690"/>
+          </a:xfrm>
+          <a:prstGeom prst="rect">
+            <a:avLst/>
+          </a:prstGeom>
+        </p:spPr>
+      </p:pic>
+      <p:pic>
+        <p:nvPicPr>
+          <p:cNvPr id="24" name="Immagine 23">
+            <a:extLst>
+              <a:ext uri="{FF2B5EF4-FFF2-40B4-BE49-F238E27FC236}">
+                <a16:creationId xmlns:a16="http://schemas.microsoft.com/office/drawing/2014/main" id="{2B97AB38-6F83-2F49-45ED-583FBC47EC9C}"/>
+              </a:ext>
+            </a:extLst>
+          </p:cNvPr>
+          <p:cNvPicPr>
+            <a:picLocks noChangeAspect="1"/>
+          </p:cNvPicPr>
+          <p:nvPr/>
+        </p:nvPicPr>
+        <p:blipFill>
+          <a:blip r:embed="rId5"/>
+          <a:stretch>
+            <a:fillRect/>
+          </a:stretch>
+        </p:blipFill>
+        <p:spPr>
+          <a:xfrm>
+            <a:off x="4985169" y="1168347"/>
+            <a:ext cx="3279070" cy="3347069"/>
+          </a:xfrm>
+          <a:prstGeom prst="rect">
+            <a:avLst/>
+          </a:prstGeom>
+        </p:spPr>
+      </p:pic>
+    </p:spTree>
+    <p:extLst>
+      <p:ext uri="{BB962C8B-B14F-4D97-AF65-F5344CB8AC3E}">
+        <p14:creationId xmlns:p14="http://schemas.microsoft.com/office/powerpoint/2010/main" val="3072474210"/>
+      </p:ext>
+    </p:extLst>
+  </p:cSld>
+  <p:clrMapOvr>
+    <a:masterClrMapping/>
+  </p:clrMapOvr>
+</p:sld>
+</file>
+
 <file path=ppt/slides/slide33.xml><?xml version="1.0" encoding="utf-8"?>
 <p:sld xmlns:a="http://schemas.openxmlformats.org/drawingml/2006/main" xmlns:r="http://schemas.openxmlformats.org/officeDocument/2006/relationships" xmlns:p="http://schemas.openxmlformats.org/presentationml/2006/main">
   <p:cSld>
@@ -6458,7 +6673,7 @@
           <a:p>
             <a:r>
               <a:rPr lang="it-IT" sz="3600" dirty="0"/>
-              <a:t>Esercizio 3: Modellazione</a:t>
+              <a:t>Esercizio 4: Cosa Stampa</a:t>
             </a:r>
           </a:p>
         </p:txBody>
@@ -6498,10 +6713,10 @@
       </p:sp>
       <p:pic>
         <p:nvPicPr>
-          <p:cNvPr id="7" name="Immagine 6">
-            <a:extLst>
-              <a:ext uri="{FF2B5EF4-FFF2-40B4-BE49-F238E27FC236}">
-                <a16:creationId xmlns:a16="http://schemas.microsoft.com/office/drawing/2014/main" id="{50851F90-DFAE-6A39-CECE-3B79FF976EBE}"/>
+          <p:cNvPr id="5" name="Immagine 4">
+            <a:extLst>
+              <a:ext uri="{FF2B5EF4-FFF2-40B4-BE49-F238E27FC236}">
+                <a16:creationId xmlns:a16="http://schemas.microsoft.com/office/drawing/2014/main" id="{A734D80C-B5B9-32DE-EF22-FDAF588D840B}"/>
               </a:ext>
             </a:extLst>
           </p:cNvPr>
@@ -6518,38 +6733,8 @@
         </p:blipFill>
         <p:spPr>
           <a:xfrm>
-            <a:off x="747147" y="2912026"/>
-            <a:ext cx="7274239" cy="2678717"/>
-          </a:xfrm>
-          <a:prstGeom prst="rect">
-            <a:avLst/>
-          </a:prstGeom>
-        </p:spPr>
-      </p:pic>
-      <p:pic>
-        <p:nvPicPr>
-          <p:cNvPr id="9" name="Immagine 8">
-            <a:extLst>
-              <a:ext uri="{FF2B5EF4-FFF2-40B4-BE49-F238E27FC236}">
-                <a16:creationId xmlns:a16="http://schemas.microsoft.com/office/drawing/2014/main" id="{F195EF58-3D4E-818F-CD71-A4532B54477D}"/>
-              </a:ext>
-            </a:extLst>
-          </p:cNvPr>
-          <p:cNvPicPr>
-            <a:picLocks noChangeAspect="1"/>
-          </p:cNvPicPr>
-          <p:nvPr/>
-        </p:nvPicPr>
-        <p:blipFill>
-          <a:blip r:embed="rId3"/>
-          <a:stretch>
-            <a:fillRect/>
-          </a:stretch>
-        </p:blipFill>
-        <p:spPr>
-          <a:xfrm>
-            <a:off x="3530753" y="1684516"/>
-            <a:ext cx="1707028" cy="922100"/>
+            <a:off x="1278808" y="1809847"/>
+            <a:ext cx="6586384" cy="3238306"/>
           </a:xfrm>
           <a:prstGeom prst="rect">
             <a:avLst/>
@@ -6559,7 +6744,7 @@
     </p:spTree>
     <p:extLst>
       <p:ext uri="{BB962C8B-B14F-4D97-AF65-F5344CB8AC3E}">
-        <p14:creationId xmlns:p14="http://schemas.microsoft.com/office/powerpoint/2010/main" val="2940009884"/>
+        <p14:creationId xmlns:p14="http://schemas.microsoft.com/office/powerpoint/2010/main" val="1417009963"/>
       </p:ext>
     </p:extLst>
   </p:cSld>
@@ -7012,8 +7197,8 @@
         </p:blipFill>
         <p:spPr>
           <a:xfrm>
-            <a:off x="1256374" y="1414149"/>
-            <a:ext cx="6424217" cy="1821338"/>
+            <a:off x="647653" y="1458877"/>
+            <a:ext cx="7790749" cy="2208765"/>
           </a:xfrm>
           <a:prstGeom prst="rect">
             <a:avLst/>
@@ -7042,8 +7227,8 @@
         </p:blipFill>
         <p:spPr>
           <a:xfrm>
-            <a:off x="1511666" y="3812295"/>
-            <a:ext cx="5913632" cy="1501270"/>
+            <a:off x="649958" y="3871310"/>
+            <a:ext cx="7844084" cy="1991346"/>
           </a:xfrm>
           <a:prstGeom prst="rect">
             <a:avLst/>
@@ -7165,8 +7350,8 @@
         </p:blipFill>
         <p:spPr>
           <a:xfrm>
-            <a:off x="1230340" y="1622903"/>
-            <a:ext cx="6683319" cy="3612193"/>
+            <a:off x="791802" y="1566919"/>
+            <a:ext cx="7804301" cy="4218060"/>
           </a:xfrm>
           <a:prstGeom prst="rect">
             <a:avLst/>
@@ -7280,7 +7465,7 @@
         </p:nvSpPr>
         <p:spPr>
           <a:xfrm>
-            <a:off x="345058" y="1500097"/>
+            <a:off x="375250" y="1345727"/>
             <a:ext cx="8393500" cy="646331"/>
           </a:xfrm>
           <a:prstGeom prst="rect">
@@ -7327,8 +7512,8 @@
         </p:blipFill>
         <p:spPr>
           <a:xfrm>
-            <a:off x="1882316" y="2232692"/>
-            <a:ext cx="5044710" cy="3639751"/>
+            <a:off x="1634616" y="1992059"/>
+            <a:ext cx="5755230" cy="4152390"/>
           </a:xfrm>
           <a:prstGeom prst="rect">
             <a:avLst/>
@@ -7506,8 +7691,8 @@
         </p:blipFill>
         <p:spPr>
           <a:xfrm>
-            <a:off x="1990137" y="1570241"/>
-            <a:ext cx="4787062" cy="3079397"/>
+            <a:off x="1887500" y="1418253"/>
+            <a:ext cx="4950810" cy="3184732"/>
           </a:xfrm>
           <a:prstGeom prst="rect">
             <a:avLst/>

</xml_diff>